<commit_message>
power point add diapo1
</commit_message>
<xml_diff>
--- a/Présentation-ocpizza.pptx
+++ b/Présentation-ocpizza.pptx
@@ -2,18 +2,19 @@
 <file path=ppt/presentation.xml><?xml version="1.0" encoding="utf-8"?>
 <p:presentation xmlns:a="http://schemas.openxmlformats.org/drawingml/2006/main" xmlns:r="http://schemas.openxmlformats.org/officeDocument/2006/relationships" xmlns:p="http://schemas.openxmlformats.org/presentationml/2006/main" saveSubsetFonts="1" autoCompressPictures="0">
   <p:sldMasterIdLst>
-    <p:sldMasterId id="2147483648" r:id="rId1"/>
+    <p:sldMasterId id="2147483672" r:id="rId1"/>
   </p:sldMasterIdLst>
   <p:sldIdLst>
-    <p:sldId id="256" r:id="rId2"/>
+    <p:sldId id="257" r:id="rId2"/>
+    <p:sldId id="258" r:id="rId3"/>
   </p:sldIdLst>
   <p:sldSz cx="12192000" cy="6858000"/>
   <p:notesSz cx="6858000" cy="9144000"/>
   <p:defaultTextStyle>
     <a:defPPr>
-      <a:defRPr lang="fr-FR"/>
+      <a:defRPr lang="en-US"/>
     </a:defPPr>
-    <a:lvl1pPr marL="0" algn="l" defTabSz="914400" rtl="0" eaLnBrk="1" latinLnBrk="0" hangingPunct="1">
+    <a:lvl1pPr marL="0" algn="l" defTabSz="457200" rtl="0" eaLnBrk="1" latinLnBrk="0" hangingPunct="1">
       <a:defRPr sz="1800" kern="1200">
         <a:solidFill>
           <a:schemeClr val="tx1"/>
@@ -23,7 +24,7 @@
         <a:cs typeface="+mn-cs"/>
       </a:defRPr>
     </a:lvl1pPr>
-    <a:lvl2pPr marL="457200" algn="l" defTabSz="914400" rtl="0" eaLnBrk="1" latinLnBrk="0" hangingPunct="1">
+    <a:lvl2pPr marL="457200" algn="l" defTabSz="457200" rtl="0" eaLnBrk="1" latinLnBrk="0" hangingPunct="1">
       <a:defRPr sz="1800" kern="1200">
         <a:solidFill>
           <a:schemeClr val="tx1"/>
@@ -33,7 +34,7 @@
         <a:cs typeface="+mn-cs"/>
       </a:defRPr>
     </a:lvl2pPr>
-    <a:lvl3pPr marL="914400" algn="l" defTabSz="914400" rtl="0" eaLnBrk="1" latinLnBrk="0" hangingPunct="1">
+    <a:lvl3pPr marL="914400" algn="l" defTabSz="457200" rtl="0" eaLnBrk="1" latinLnBrk="0" hangingPunct="1">
       <a:defRPr sz="1800" kern="1200">
         <a:solidFill>
           <a:schemeClr val="tx1"/>
@@ -43,7 +44,7 @@
         <a:cs typeface="+mn-cs"/>
       </a:defRPr>
     </a:lvl3pPr>
-    <a:lvl4pPr marL="1371600" algn="l" defTabSz="914400" rtl="0" eaLnBrk="1" latinLnBrk="0" hangingPunct="1">
+    <a:lvl4pPr marL="1371600" algn="l" defTabSz="457200" rtl="0" eaLnBrk="1" latinLnBrk="0" hangingPunct="1">
       <a:defRPr sz="1800" kern="1200">
         <a:solidFill>
           <a:schemeClr val="tx1"/>
@@ -53,7 +54,7 @@
         <a:cs typeface="+mn-cs"/>
       </a:defRPr>
     </a:lvl4pPr>
-    <a:lvl5pPr marL="1828800" algn="l" defTabSz="914400" rtl="0" eaLnBrk="1" latinLnBrk="0" hangingPunct="1">
+    <a:lvl5pPr marL="1828800" algn="l" defTabSz="457200" rtl="0" eaLnBrk="1" latinLnBrk="0" hangingPunct="1">
       <a:defRPr sz="1800" kern="1200">
         <a:solidFill>
           <a:schemeClr val="tx1"/>
@@ -63,7 +64,7 @@
         <a:cs typeface="+mn-cs"/>
       </a:defRPr>
     </a:lvl5pPr>
-    <a:lvl6pPr marL="2286000" algn="l" defTabSz="914400" rtl="0" eaLnBrk="1" latinLnBrk="0" hangingPunct="1">
+    <a:lvl6pPr marL="2286000" algn="l" defTabSz="457200" rtl="0" eaLnBrk="1" latinLnBrk="0" hangingPunct="1">
       <a:defRPr sz="1800" kern="1200">
         <a:solidFill>
           <a:schemeClr val="tx1"/>
@@ -73,7 +74,7 @@
         <a:cs typeface="+mn-cs"/>
       </a:defRPr>
     </a:lvl6pPr>
-    <a:lvl7pPr marL="2743200" algn="l" defTabSz="914400" rtl="0" eaLnBrk="1" latinLnBrk="0" hangingPunct="1">
+    <a:lvl7pPr marL="2743200" algn="l" defTabSz="457200" rtl="0" eaLnBrk="1" latinLnBrk="0" hangingPunct="1">
       <a:defRPr sz="1800" kern="1200">
         <a:solidFill>
           <a:schemeClr val="tx1"/>
@@ -83,7 +84,7 @@
         <a:cs typeface="+mn-cs"/>
       </a:defRPr>
     </a:lvl7pPr>
-    <a:lvl8pPr marL="3200400" algn="l" defTabSz="914400" rtl="0" eaLnBrk="1" latinLnBrk="0" hangingPunct="1">
+    <a:lvl8pPr marL="3200400" algn="l" defTabSz="457200" rtl="0" eaLnBrk="1" latinLnBrk="0" hangingPunct="1">
       <a:defRPr sz="1800" kern="1200">
         <a:solidFill>
           <a:schemeClr val="tx1"/>
@@ -93,7 +94,7 @@
         <a:cs typeface="+mn-cs"/>
       </a:defRPr>
     </a:lvl8pPr>
-    <a:lvl9pPr marL="3657600" algn="l" defTabSz="914400" rtl="0" eaLnBrk="1" latinLnBrk="0" hangingPunct="1">
+    <a:lvl9pPr marL="3657600" algn="l" defTabSz="457200" rtl="0" eaLnBrk="1" latinLnBrk="0" hangingPunct="1">
       <a:defRPr sz="1800" kern="1200">
         <a:solidFill>
           <a:schemeClr val="tx1"/>
@@ -104,34 +105,12 @@
       </a:defRPr>
     </a:lvl9pPr>
   </p:defaultTextStyle>
+  <p:extLst>
+    <p:ext uri="{EFAFB233-063F-42B5-8137-9DF3F51BA10A}">
+      <p15:sldGuideLst xmlns:p15="http://schemas.microsoft.com/office/powerpoint/2012/main"/>
+    </p:ext>
+  </p:extLst>
 </p:presentation>
-</file>
-
-<file path=ppt/ink/ink1.xml><?xml version="1.0" encoding="utf-8"?>
-<inkml:ink xmlns:inkml="http://www.w3.org/2003/InkML">
-  <inkml:definitions>
-    <inkml:context xml:id="ctx0">
-      <inkml:inkSource xml:id="inkSrc0">
-        <inkml:traceFormat>
-          <inkml:channel name="X" type="integer" min="-2.14748E9" max="2.14748E9" units="cm"/>
-          <inkml:channel name="Y" type="integer" min="-2.14748E9" max="2.14748E9" units="cm"/>
-          <inkml:channel name="F" type="integer" max="32767" units="dev"/>
-        </inkml:traceFormat>
-        <inkml:channelProperties>
-          <inkml:channelProperty channel="X" name="resolution" value="1000" units="1/cm"/>
-          <inkml:channelProperty channel="Y" name="resolution" value="1000" units="1/cm"/>
-          <inkml:channelProperty channel="F" name="resolution" value="0" units="1/dev"/>
-        </inkml:channelProperties>
-      </inkml:inkSource>
-      <inkml:timestamp xml:id="ts0" timeString="2018-10-26T14:37:06.340"/>
-    </inkml:context>
-    <inkml:brush xml:id="br0">
-      <inkml:brushProperty name="width" value="0.05" units="cm"/>
-      <inkml:brushProperty name="height" value="0.05" units="cm"/>
-    </inkml:brush>
-  </inkml:definitions>
-  <inkml:trace contextRef="#ctx0" brushRef="#br0">1 1 24575,'0'0'0</inkml:trace>
-</inkml:ink>
 </file>
 
 <file path=ppt/slideLayouts/slideLayout1.xml><?xml version="1.0" encoding="utf-8"?>
@@ -153,13 +132,7 @@
       </p:grpSpPr>
       <p:sp>
         <p:nvSpPr>
-          <p:cNvPr id="2" name="Titre 1">
-            <a:extLst>
-              <a:ext uri="{FF2B5EF4-FFF2-40B4-BE49-F238E27FC236}">
-                <a16:creationId xmlns:a16="http://schemas.microsoft.com/office/drawing/2014/main" id="{129D7AA8-827C-614D-90E7-5EEA780DF1CB}"/>
-              </a:ext>
-            </a:extLst>
-          </p:cNvPr>
+          <p:cNvPr id="2" name="Title 1"/>
           <p:cNvSpPr>
             <a:spLocks noGrp="1"/>
           </p:cNvSpPr>
@@ -185,18 +158,13 @@
               <a:rPr lang="fr-FR"/>
               <a:t>Modifiez le style du titre</a:t>
             </a:r>
-          </a:p>
-        </p:txBody>
-      </p:sp>
-      <p:sp>
-        <p:nvSpPr>
-          <p:cNvPr id="3" name="Sous-titre 2">
-            <a:extLst>
-              <a:ext uri="{FF2B5EF4-FFF2-40B4-BE49-F238E27FC236}">
-                <a16:creationId xmlns:a16="http://schemas.microsoft.com/office/drawing/2014/main" id="{85BA41D2-A680-164D-8C8E-EE13A709551B}"/>
-              </a:ext>
-            </a:extLst>
-          </p:cNvPr>
+            <a:endParaRPr lang="en-US" dirty="0"/>
+          </a:p>
+        </p:txBody>
+      </p:sp>
+      <p:sp>
+        <p:nvSpPr>
+          <p:cNvPr id="3" name="Subtitle 2"/>
           <p:cNvSpPr>
             <a:spLocks noGrp="1"/>
           </p:cNvSpPr>
@@ -255,18 +223,13 @@
               <a:rPr lang="fr-FR"/>
               <a:t>Modifiez le style des sous-titres du masque</a:t>
             </a:r>
-          </a:p>
-        </p:txBody>
-      </p:sp>
-      <p:sp>
-        <p:nvSpPr>
-          <p:cNvPr id="4" name="Espace réservé de la date 3">
-            <a:extLst>
-              <a:ext uri="{FF2B5EF4-FFF2-40B4-BE49-F238E27FC236}">
-                <a16:creationId xmlns:a16="http://schemas.microsoft.com/office/drawing/2014/main" id="{B74DB6A4-D174-1744-A03C-BF18B4960074}"/>
-              </a:ext>
-            </a:extLst>
-          </p:cNvPr>
+            <a:endParaRPr lang="en-US" dirty="0"/>
+          </a:p>
+        </p:txBody>
+      </p:sp>
+      <p:sp>
+        <p:nvSpPr>
+          <p:cNvPr id="4" name="Date Placeholder 3"/>
           <p:cNvSpPr>
             <a:spLocks noGrp="1"/>
           </p:cNvSpPr>
@@ -281,7 +244,7 @@
           <a:p>
             <a:fld id="{5095E208-7D3B-7E40-8085-C5996EEE4BD8}" type="datetimeFigureOut">
               <a:rPr lang="fr-FR" smtClean="0"/>
-              <a:t>02/12/2018</a:t>
+              <a:t>23/12/2018</a:t>
             </a:fld>
             <a:endParaRPr lang="fr-FR"/>
           </a:p>
@@ -289,13 +252,7 @@
       </p:sp>
       <p:sp>
         <p:nvSpPr>
-          <p:cNvPr id="5" name="Espace réservé du pied de page 4">
-            <a:extLst>
-              <a:ext uri="{FF2B5EF4-FFF2-40B4-BE49-F238E27FC236}">
-                <a16:creationId xmlns:a16="http://schemas.microsoft.com/office/drawing/2014/main" id="{F7B1D204-83F4-3240-9E84-3D431B82D6F2}"/>
-              </a:ext>
-            </a:extLst>
-          </p:cNvPr>
+          <p:cNvPr id="5" name="Footer Placeholder 4"/>
           <p:cNvSpPr>
             <a:spLocks noGrp="1"/>
           </p:cNvSpPr>
@@ -314,13 +271,7 @@
       </p:sp>
       <p:sp>
         <p:nvSpPr>
-          <p:cNvPr id="6" name="Espace réservé du numéro de diapositive 5">
-            <a:extLst>
-              <a:ext uri="{FF2B5EF4-FFF2-40B4-BE49-F238E27FC236}">
-                <a16:creationId xmlns:a16="http://schemas.microsoft.com/office/drawing/2014/main" id="{726185F9-736C-BA48-9ADE-73456BEBB883}"/>
-              </a:ext>
-            </a:extLst>
-          </p:cNvPr>
+          <p:cNvPr id="6" name="Slide Number Placeholder 5"/>
           <p:cNvSpPr>
             <a:spLocks noGrp="1"/>
           </p:cNvSpPr>
@@ -344,7 +295,7 @@
     </p:spTree>
     <p:extLst>
       <p:ext uri="{BB962C8B-B14F-4D97-AF65-F5344CB8AC3E}">
-        <p14:creationId xmlns:p14="http://schemas.microsoft.com/office/powerpoint/2010/main" val="643974354"/>
+        <p14:creationId xmlns:p14="http://schemas.microsoft.com/office/powerpoint/2010/main" val="1491116727"/>
       </p:ext>
     </p:extLst>
   </p:cSld>
@@ -373,13 +324,7 @@
       </p:grpSpPr>
       <p:sp>
         <p:nvSpPr>
-          <p:cNvPr id="2" name="Titre 1">
-            <a:extLst>
-              <a:ext uri="{FF2B5EF4-FFF2-40B4-BE49-F238E27FC236}">
-                <a16:creationId xmlns:a16="http://schemas.microsoft.com/office/drawing/2014/main" id="{C5C7860C-4CB1-124F-BD31-03733474789C}"/>
-              </a:ext>
-            </a:extLst>
-          </p:cNvPr>
+          <p:cNvPr id="2" name="Title 1"/>
           <p:cNvSpPr>
             <a:spLocks noGrp="1"/>
           </p:cNvSpPr>
@@ -396,18 +341,13 @@
               <a:rPr lang="fr-FR"/>
               <a:t>Modifiez le style du titre</a:t>
             </a:r>
-          </a:p>
-        </p:txBody>
-      </p:sp>
-      <p:sp>
-        <p:nvSpPr>
-          <p:cNvPr id="3" name="Espace réservé du texte vertical 2">
-            <a:extLst>
-              <a:ext uri="{FF2B5EF4-FFF2-40B4-BE49-F238E27FC236}">
-                <a16:creationId xmlns:a16="http://schemas.microsoft.com/office/drawing/2014/main" id="{A56629AA-0492-274B-84C6-7B266BE5974D}"/>
-              </a:ext>
-            </a:extLst>
-          </p:cNvPr>
+            <a:endParaRPr lang="en-US" dirty="0"/>
+          </a:p>
+        </p:txBody>
+      </p:sp>
+      <p:sp>
+        <p:nvSpPr>
+          <p:cNvPr id="3" name="Vertical Text Placeholder 2"/>
           <p:cNvSpPr>
             <a:spLocks noGrp="1"/>
           </p:cNvSpPr>
@@ -420,6 +360,7 @@
           <a:bodyPr vert="eaVert"/>
           <a:lstStyle/>
           <a:p>
+            <a:pPr lvl="0"/>
             <a:r>
               <a:rPr lang="fr-FR"/>
               <a:t>Modifier les styles du texte du masque
@@ -428,18 +369,13 @@
 Quatrième niveau
 Cinquième niveau</a:t>
             </a:r>
-          </a:p>
-        </p:txBody>
-      </p:sp>
-      <p:sp>
-        <p:nvSpPr>
-          <p:cNvPr id="4" name="Espace réservé de la date 3">
-            <a:extLst>
-              <a:ext uri="{FF2B5EF4-FFF2-40B4-BE49-F238E27FC236}">
-                <a16:creationId xmlns:a16="http://schemas.microsoft.com/office/drawing/2014/main" id="{3694E9BF-9ED1-7240-BC19-76A1347C33F8}"/>
-              </a:ext>
-            </a:extLst>
-          </p:cNvPr>
+            <a:endParaRPr lang="en-US" dirty="0"/>
+          </a:p>
+        </p:txBody>
+      </p:sp>
+      <p:sp>
+        <p:nvSpPr>
+          <p:cNvPr id="4" name="Date Placeholder 3"/>
           <p:cNvSpPr>
             <a:spLocks noGrp="1"/>
           </p:cNvSpPr>
@@ -454,7 +390,7 @@
           <a:p>
             <a:fld id="{5095E208-7D3B-7E40-8085-C5996EEE4BD8}" type="datetimeFigureOut">
               <a:rPr lang="fr-FR" smtClean="0"/>
-              <a:t>02/12/2018</a:t>
+              <a:t>23/12/2018</a:t>
             </a:fld>
             <a:endParaRPr lang="fr-FR"/>
           </a:p>
@@ -462,13 +398,7 @@
       </p:sp>
       <p:sp>
         <p:nvSpPr>
-          <p:cNvPr id="5" name="Espace réservé du pied de page 4">
-            <a:extLst>
-              <a:ext uri="{FF2B5EF4-FFF2-40B4-BE49-F238E27FC236}">
-                <a16:creationId xmlns:a16="http://schemas.microsoft.com/office/drawing/2014/main" id="{198AB357-714E-0044-B161-F9A242CC157F}"/>
-              </a:ext>
-            </a:extLst>
-          </p:cNvPr>
+          <p:cNvPr id="5" name="Footer Placeholder 4"/>
           <p:cNvSpPr>
             <a:spLocks noGrp="1"/>
           </p:cNvSpPr>
@@ -487,13 +417,7 @@
       </p:sp>
       <p:sp>
         <p:nvSpPr>
-          <p:cNvPr id="6" name="Espace réservé du numéro de diapositive 5">
-            <a:extLst>
-              <a:ext uri="{FF2B5EF4-FFF2-40B4-BE49-F238E27FC236}">
-                <a16:creationId xmlns:a16="http://schemas.microsoft.com/office/drawing/2014/main" id="{5291E06B-ED53-324E-8B4C-F5ED500980C8}"/>
-              </a:ext>
-            </a:extLst>
-          </p:cNvPr>
+          <p:cNvPr id="6" name="Slide Number Placeholder 5"/>
           <p:cNvSpPr>
             <a:spLocks noGrp="1"/>
           </p:cNvSpPr>
@@ -517,7 +441,7 @@
     </p:spTree>
     <p:extLst>
       <p:ext uri="{BB962C8B-B14F-4D97-AF65-F5344CB8AC3E}">
-        <p14:creationId xmlns:p14="http://schemas.microsoft.com/office/powerpoint/2010/main" val="3122701761"/>
+        <p14:creationId xmlns:p14="http://schemas.microsoft.com/office/powerpoint/2010/main" val="3161845475"/>
       </p:ext>
     </p:extLst>
   </p:cSld>
@@ -546,13 +470,7 @@
       </p:grpSpPr>
       <p:sp>
         <p:nvSpPr>
-          <p:cNvPr id="2" name="Titre vertical 1">
-            <a:extLst>
-              <a:ext uri="{FF2B5EF4-FFF2-40B4-BE49-F238E27FC236}">
-                <a16:creationId xmlns:a16="http://schemas.microsoft.com/office/drawing/2014/main" id="{2852973E-E982-B743-9B1C-D53FC6293932}"/>
-              </a:ext>
-            </a:extLst>
-          </p:cNvPr>
+          <p:cNvPr id="2" name="Vertical Title 1"/>
           <p:cNvSpPr>
             <a:spLocks noGrp="1"/>
           </p:cNvSpPr>
@@ -574,18 +492,13 @@
               <a:rPr lang="fr-FR"/>
               <a:t>Modifiez le style du titre</a:t>
             </a:r>
-          </a:p>
-        </p:txBody>
-      </p:sp>
-      <p:sp>
-        <p:nvSpPr>
-          <p:cNvPr id="3" name="Espace réservé du texte vertical 2">
-            <a:extLst>
-              <a:ext uri="{FF2B5EF4-FFF2-40B4-BE49-F238E27FC236}">
-                <a16:creationId xmlns:a16="http://schemas.microsoft.com/office/drawing/2014/main" id="{BA3E389C-E984-2D4A-BEA2-C97066069906}"/>
-              </a:ext>
-            </a:extLst>
-          </p:cNvPr>
+            <a:endParaRPr lang="en-US" dirty="0"/>
+          </a:p>
+        </p:txBody>
+      </p:sp>
+      <p:sp>
+        <p:nvSpPr>
+          <p:cNvPr id="3" name="Vertical Text Placeholder 2"/>
           <p:cNvSpPr>
             <a:spLocks noGrp="1"/>
           </p:cNvSpPr>
@@ -603,6 +516,7 @@
           <a:bodyPr vert="eaVert"/>
           <a:lstStyle/>
           <a:p>
+            <a:pPr lvl="0"/>
             <a:r>
               <a:rPr lang="fr-FR"/>
               <a:t>Modifier les styles du texte du masque
@@ -611,18 +525,13 @@
 Quatrième niveau
 Cinquième niveau</a:t>
             </a:r>
-          </a:p>
-        </p:txBody>
-      </p:sp>
-      <p:sp>
-        <p:nvSpPr>
-          <p:cNvPr id="4" name="Espace réservé de la date 3">
-            <a:extLst>
-              <a:ext uri="{FF2B5EF4-FFF2-40B4-BE49-F238E27FC236}">
-                <a16:creationId xmlns:a16="http://schemas.microsoft.com/office/drawing/2014/main" id="{231AE7DE-B0B9-F249-92F1-0574A0B50D8C}"/>
-              </a:ext>
-            </a:extLst>
-          </p:cNvPr>
+            <a:endParaRPr lang="en-US" dirty="0"/>
+          </a:p>
+        </p:txBody>
+      </p:sp>
+      <p:sp>
+        <p:nvSpPr>
+          <p:cNvPr id="4" name="Date Placeholder 3"/>
           <p:cNvSpPr>
             <a:spLocks noGrp="1"/>
           </p:cNvSpPr>
@@ -637,7 +546,7 @@
           <a:p>
             <a:fld id="{5095E208-7D3B-7E40-8085-C5996EEE4BD8}" type="datetimeFigureOut">
               <a:rPr lang="fr-FR" smtClean="0"/>
-              <a:t>02/12/2018</a:t>
+              <a:t>23/12/2018</a:t>
             </a:fld>
             <a:endParaRPr lang="fr-FR"/>
           </a:p>
@@ -645,13 +554,7 @@
       </p:sp>
       <p:sp>
         <p:nvSpPr>
-          <p:cNvPr id="5" name="Espace réservé du pied de page 4">
-            <a:extLst>
-              <a:ext uri="{FF2B5EF4-FFF2-40B4-BE49-F238E27FC236}">
-                <a16:creationId xmlns:a16="http://schemas.microsoft.com/office/drawing/2014/main" id="{B65D07DE-3E3E-5F40-90CA-E22FB707203D}"/>
-              </a:ext>
-            </a:extLst>
-          </p:cNvPr>
+          <p:cNvPr id="5" name="Footer Placeholder 4"/>
           <p:cNvSpPr>
             <a:spLocks noGrp="1"/>
           </p:cNvSpPr>
@@ -670,13 +573,7 @@
       </p:sp>
       <p:sp>
         <p:nvSpPr>
-          <p:cNvPr id="6" name="Espace réservé du numéro de diapositive 5">
-            <a:extLst>
-              <a:ext uri="{FF2B5EF4-FFF2-40B4-BE49-F238E27FC236}">
-                <a16:creationId xmlns:a16="http://schemas.microsoft.com/office/drawing/2014/main" id="{C129BC8C-636B-2341-918F-15BB2D7843E8}"/>
-              </a:ext>
-            </a:extLst>
-          </p:cNvPr>
+          <p:cNvPr id="6" name="Slide Number Placeholder 5"/>
           <p:cNvSpPr>
             <a:spLocks noGrp="1"/>
           </p:cNvSpPr>
@@ -700,7 +597,7 @@
     </p:spTree>
     <p:extLst>
       <p:ext uri="{BB962C8B-B14F-4D97-AF65-F5344CB8AC3E}">
-        <p14:creationId xmlns:p14="http://schemas.microsoft.com/office/powerpoint/2010/main" val="3857976938"/>
+        <p14:creationId xmlns:p14="http://schemas.microsoft.com/office/powerpoint/2010/main" val="979533956"/>
       </p:ext>
     </p:extLst>
   </p:cSld>
@@ -729,13 +626,7 @@
       </p:grpSpPr>
       <p:sp>
         <p:nvSpPr>
-          <p:cNvPr id="2" name="Titre 1">
-            <a:extLst>
-              <a:ext uri="{FF2B5EF4-FFF2-40B4-BE49-F238E27FC236}">
-                <a16:creationId xmlns:a16="http://schemas.microsoft.com/office/drawing/2014/main" id="{FE832B65-06A9-2246-8C44-B0A0A62A9BC1}"/>
-              </a:ext>
-            </a:extLst>
-          </p:cNvPr>
+          <p:cNvPr id="2" name="Title 1"/>
           <p:cNvSpPr>
             <a:spLocks noGrp="1"/>
           </p:cNvSpPr>
@@ -752,18 +643,13 @@
               <a:rPr lang="fr-FR"/>
               <a:t>Modifiez le style du titre</a:t>
             </a:r>
-          </a:p>
-        </p:txBody>
-      </p:sp>
-      <p:sp>
-        <p:nvSpPr>
-          <p:cNvPr id="3" name="Espace réservé du contenu 2">
-            <a:extLst>
-              <a:ext uri="{FF2B5EF4-FFF2-40B4-BE49-F238E27FC236}">
-                <a16:creationId xmlns:a16="http://schemas.microsoft.com/office/drawing/2014/main" id="{78988B35-AF65-DF46-99C7-4287CA7E767D}"/>
-              </a:ext>
-            </a:extLst>
-          </p:cNvPr>
+            <a:endParaRPr lang="en-US" dirty="0"/>
+          </a:p>
+        </p:txBody>
+      </p:sp>
+      <p:sp>
+        <p:nvSpPr>
+          <p:cNvPr id="3" name="Content Placeholder 2"/>
           <p:cNvSpPr>
             <a:spLocks noGrp="1"/>
           </p:cNvSpPr>
@@ -776,6 +662,7 @@
           <a:bodyPr/>
           <a:lstStyle/>
           <a:p>
+            <a:pPr lvl="0"/>
             <a:r>
               <a:rPr lang="fr-FR"/>
               <a:t>Modifier les styles du texte du masque
@@ -784,18 +671,13 @@
 Quatrième niveau
 Cinquième niveau</a:t>
             </a:r>
-          </a:p>
-        </p:txBody>
-      </p:sp>
-      <p:sp>
-        <p:nvSpPr>
-          <p:cNvPr id="4" name="Espace réservé de la date 3">
-            <a:extLst>
-              <a:ext uri="{FF2B5EF4-FFF2-40B4-BE49-F238E27FC236}">
-                <a16:creationId xmlns:a16="http://schemas.microsoft.com/office/drawing/2014/main" id="{FFF91FC7-1EBF-E944-A09C-7649C56E951A}"/>
-              </a:ext>
-            </a:extLst>
-          </p:cNvPr>
+            <a:endParaRPr lang="en-US" dirty="0"/>
+          </a:p>
+        </p:txBody>
+      </p:sp>
+      <p:sp>
+        <p:nvSpPr>
+          <p:cNvPr id="4" name="Date Placeholder 3"/>
           <p:cNvSpPr>
             <a:spLocks noGrp="1"/>
           </p:cNvSpPr>
@@ -810,7 +692,7 @@
           <a:p>
             <a:fld id="{5095E208-7D3B-7E40-8085-C5996EEE4BD8}" type="datetimeFigureOut">
               <a:rPr lang="fr-FR" smtClean="0"/>
-              <a:t>02/12/2018</a:t>
+              <a:t>23/12/2018</a:t>
             </a:fld>
             <a:endParaRPr lang="fr-FR"/>
           </a:p>
@@ -818,13 +700,7 @@
       </p:sp>
       <p:sp>
         <p:nvSpPr>
-          <p:cNvPr id="5" name="Espace réservé du pied de page 4">
-            <a:extLst>
-              <a:ext uri="{FF2B5EF4-FFF2-40B4-BE49-F238E27FC236}">
-                <a16:creationId xmlns:a16="http://schemas.microsoft.com/office/drawing/2014/main" id="{8BF215A7-57F7-6344-B8A2-3347F78E01AB}"/>
-              </a:ext>
-            </a:extLst>
-          </p:cNvPr>
+          <p:cNvPr id="5" name="Footer Placeholder 4"/>
           <p:cNvSpPr>
             <a:spLocks noGrp="1"/>
           </p:cNvSpPr>
@@ -843,13 +719,7 @@
       </p:sp>
       <p:sp>
         <p:nvSpPr>
-          <p:cNvPr id="6" name="Espace réservé du numéro de diapositive 5">
-            <a:extLst>
-              <a:ext uri="{FF2B5EF4-FFF2-40B4-BE49-F238E27FC236}">
-                <a16:creationId xmlns:a16="http://schemas.microsoft.com/office/drawing/2014/main" id="{B39A1F7E-3D6B-E048-BFCC-7358D804F3D0}"/>
-              </a:ext>
-            </a:extLst>
-          </p:cNvPr>
+          <p:cNvPr id="6" name="Slide Number Placeholder 5"/>
           <p:cNvSpPr>
             <a:spLocks noGrp="1"/>
           </p:cNvSpPr>
@@ -873,7 +743,7 @@
     </p:spTree>
     <p:extLst>
       <p:ext uri="{BB962C8B-B14F-4D97-AF65-F5344CB8AC3E}">
-        <p14:creationId xmlns:p14="http://schemas.microsoft.com/office/powerpoint/2010/main" val="2261548278"/>
+        <p14:creationId xmlns:p14="http://schemas.microsoft.com/office/powerpoint/2010/main" val="4142566536"/>
       </p:ext>
     </p:extLst>
   </p:cSld>
@@ -902,13 +772,7 @@
       </p:grpSpPr>
       <p:sp>
         <p:nvSpPr>
-          <p:cNvPr id="2" name="Titre 1">
-            <a:extLst>
-              <a:ext uri="{FF2B5EF4-FFF2-40B4-BE49-F238E27FC236}">
-                <a16:creationId xmlns:a16="http://schemas.microsoft.com/office/drawing/2014/main" id="{16AEE75A-2C54-6047-9AF8-1F6A0CFEAD20}"/>
-              </a:ext>
-            </a:extLst>
-          </p:cNvPr>
+          <p:cNvPr id="2" name="Title 1"/>
           <p:cNvSpPr>
             <a:spLocks noGrp="1"/>
           </p:cNvSpPr>
@@ -934,18 +798,13 @@
               <a:rPr lang="fr-FR"/>
               <a:t>Modifiez le style du titre</a:t>
             </a:r>
-          </a:p>
-        </p:txBody>
-      </p:sp>
-      <p:sp>
-        <p:nvSpPr>
-          <p:cNvPr id="3" name="Espace réservé du texte 2">
-            <a:extLst>
-              <a:ext uri="{FF2B5EF4-FFF2-40B4-BE49-F238E27FC236}">
-                <a16:creationId xmlns:a16="http://schemas.microsoft.com/office/drawing/2014/main" id="{2E4C5635-E219-5A40-85C1-ABF1012F12D5}"/>
-              </a:ext>
-            </a:extLst>
-          </p:cNvPr>
+            <a:endParaRPr lang="en-US" dirty="0"/>
+          </a:p>
+        </p:txBody>
+      </p:sp>
+      <p:sp>
+        <p:nvSpPr>
+          <p:cNvPr id="3" name="Text Placeholder 2"/>
           <p:cNvSpPr>
             <a:spLocks noGrp="1"/>
           </p:cNvSpPr>
@@ -1054,6 +913,7 @@
             </a:lvl9pPr>
           </a:lstStyle>
           <a:p>
+            <a:pPr lvl="0"/>
             <a:r>
               <a:rPr lang="fr-FR"/>
               <a:t>Modifier les styles du texte du masque
@@ -1062,18 +922,13 @@
 Quatrième niveau
 Cinquième niveau</a:t>
             </a:r>
-          </a:p>
-        </p:txBody>
-      </p:sp>
-      <p:sp>
-        <p:nvSpPr>
-          <p:cNvPr id="4" name="Espace réservé de la date 3">
-            <a:extLst>
-              <a:ext uri="{FF2B5EF4-FFF2-40B4-BE49-F238E27FC236}">
-                <a16:creationId xmlns:a16="http://schemas.microsoft.com/office/drawing/2014/main" id="{F3E5F424-6F20-1748-BAA3-F351E4AAF68B}"/>
-              </a:ext>
-            </a:extLst>
-          </p:cNvPr>
+            <a:endParaRPr lang="en-US" dirty="0"/>
+          </a:p>
+        </p:txBody>
+      </p:sp>
+      <p:sp>
+        <p:nvSpPr>
+          <p:cNvPr id="4" name="Date Placeholder 3"/>
           <p:cNvSpPr>
             <a:spLocks noGrp="1"/>
           </p:cNvSpPr>
@@ -1088,7 +943,7 @@
           <a:p>
             <a:fld id="{5095E208-7D3B-7E40-8085-C5996EEE4BD8}" type="datetimeFigureOut">
               <a:rPr lang="fr-FR" smtClean="0"/>
-              <a:t>02/12/2018</a:t>
+              <a:t>23/12/2018</a:t>
             </a:fld>
             <a:endParaRPr lang="fr-FR"/>
           </a:p>
@@ -1096,13 +951,7 @@
       </p:sp>
       <p:sp>
         <p:nvSpPr>
-          <p:cNvPr id="5" name="Espace réservé du pied de page 4">
-            <a:extLst>
-              <a:ext uri="{FF2B5EF4-FFF2-40B4-BE49-F238E27FC236}">
-                <a16:creationId xmlns:a16="http://schemas.microsoft.com/office/drawing/2014/main" id="{CF54C817-10E8-E644-91EA-D4AEC61BDC1F}"/>
-              </a:ext>
-            </a:extLst>
-          </p:cNvPr>
+          <p:cNvPr id="5" name="Footer Placeholder 4"/>
           <p:cNvSpPr>
             <a:spLocks noGrp="1"/>
           </p:cNvSpPr>
@@ -1121,13 +970,7 @@
       </p:sp>
       <p:sp>
         <p:nvSpPr>
-          <p:cNvPr id="6" name="Espace réservé du numéro de diapositive 5">
-            <a:extLst>
-              <a:ext uri="{FF2B5EF4-FFF2-40B4-BE49-F238E27FC236}">
-                <a16:creationId xmlns:a16="http://schemas.microsoft.com/office/drawing/2014/main" id="{9CD21161-2F64-FF4C-96EB-E6FF849BA5A0}"/>
-              </a:ext>
-            </a:extLst>
-          </p:cNvPr>
+          <p:cNvPr id="6" name="Slide Number Placeholder 5"/>
           <p:cNvSpPr>
             <a:spLocks noGrp="1"/>
           </p:cNvSpPr>
@@ -1151,7 +994,7 @@
     </p:spTree>
     <p:extLst>
       <p:ext uri="{BB962C8B-B14F-4D97-AF65-F5344CB8AC3E}">
-        <p14:creationId xmlns:p14="http://schemas.microsoft.com/office/powerpoint/2010/main" val="3936562195"/>
+        <p14:creationId xmlns:p14="http://schemas.microsoft.com/office/powerpoint/2010/main" val="4224272932"/>
       </p:ext>
     </p:extLst>
   </p:cSld>
@@ -1180,13 +1023,7 @@
       </p:grpSpPr>
       <p:sp>
         <p:nvSpPr>
-          <p:cNvPr id="2" name="Titre 1">
-            <a:extLst>
-              <a:ext uri="{FF2B5EF4-FFF2-40B4-BE49-F238E27FC236}">
-                <a16:creationId xmlns:a16="http://schemas.microsoft.com/office/drawing/2014/main" id="{C9545558-B3D0-174B-9DAE-BC656B5260D8}"/>
-              </a:ext>
-            </a:extLst>
-          </p:cNvPr>
+          <p:cNvPr id="2" name="Title 1"/>
           <p:cNvSpPr>
             <a:spLocks noGrp="1"/>
           </p:cNvSpPr>
@@ -1203,18 +1040,13 @@
               <a:rPr lang="fr-FR"/>
               <a:t>Modifiez le style du titre</a:t>
             </a:r>
-          </a:p>
-        </p:txBody>
-      </p:sp>
-      <p:sp>
-        <p:nvSpPr>
-          <p:cNvPr id="3" name="Espace réservé du contenu 2">
-            <a:extLst>
-              <a:ext uri="{FF2B5EF4-FFF2-40B4-BE49-F238E27FC236}">
-                <a16:creationId xmlns:a16="http://schemas.microsoft.com/office/drawing/2014/main" id="{020EEF86-DA68-0342-BB4E-10691818E2B5}"/>
-              </a:ext>
-            </a:extLst>
-          </p:cNvPr>
+            <a:endParaRPr lang="en-US" dirty="0"/>
+          </a:p>
+        </p:txBody>
+      </p:sp>
+      <p:sp>
+        <p:nvSpPr>
+          <p:cNvPr id="3" name="Content Placeholder 2"/>
           <p:cNvSpPr>
             <a:spLocks noGrp="1"/>
           </p:cNvSpPr>
@@ -1232,6 +1064,7 @@
           <a:bodyPr/>
           <a:lstStyle/>
           <a:p>
+            <a:pPr lvl="0"/>
             <a:r>
               <a:rPr lang="fr-FR"/>
               <a:t>Modifier les styles du texte du masque
@@ -1240,18 +1073,13 @@
 Quatrième niveau
 Cinquième niveau</a:t>
             </a:r>
-          </a:p>
-        </p:txBody>
-      </p:sp>
-      <p:sp>
-        <p:nvSpPr>
-          <p:cNvPr id="4" name="Espace réservé du contenu 3">
-            <a:extLst>
-              <a:ext uri="{FF2B5EF4-FFF2-40B4-BE49-F238E27FC236}">
-                <a16:creationId xmlns:a16="http://schemas.microsoft.com/office/drawing/2014/main" id="{B207148C-A83F-D648-B705-F6B3C54D797D}"/>
-              </a:ext>
-            </a:extLst>
-          </p:cNvPr>
+            <a:endParaRPr lang="en-US" dirty="0"/>
+          </a:p>
+        </p:txBody>
+      </p:sp>
+      <p:sp>
+        <p:nvSpPr>
+          <p:cNvPr id="4" name="Content Placeholder 3"/>
           <p:cNvSpPr>
             <a:spLocks noGrp="1"/>
           </p:cNvSpPr>
@@ -1269,6 +1097,7 @@
           <a:bodyPr/>
           <a:lstStyle/>
           <a:p>
+            <a:pPr lvl="0"/>
             <a:r>
               <a:rPr lang="fr-FR"/>
               <a:t>Modifier les styles du texte du masque
@@ -1277,18 +1106,13 @@
 Quatrième niveau
 Cinquième niveau</a:t>
             </a:r>
-          </a:p>
-        </p:txBody>
-      </p:sp>
-      <p:sp>
-        <p:nvSpPr>
-          <p:cNvPr id="5" name="Espace réservé de la date 4">
-            <a:extLst>
-              <a:ext uri="{FF2B5EF4-FFF2-40B4-BE49-F238E27FC236}">
-                <a16:creationId xmlns:a16="http://schemas.microsoft.com/office/drawing/2014/main" id="{3B0AB8D1-243F-A547-AB8A-464A7CD6866A}"/>
-              </a:ext>
-            </a:extLst>
-          </p:cNvPr>
+            <a:endParaRPr lang="en-US" dirty="0"/>
+          </a:p>
+        </p:txBody>
+      </p:sp>
+      <p:sp>
+        <p:nvSpPr>
+          <p:cNvPr id="5" name="Date Placeholder 4"/>
           <p:cNvSpPr>
             <a:spLocks noGrp="1"/>
           </p:cNvSpPr>
@@ -1303,7 +1127,7 @@
           <a:p>
             <a:fld id="{5095E208-7D3B-7E40-8085-C5996EEE4BD8}" type="datetimeFigureOut">
               <a:rPr lang="fr-FR" smtClean="0"/>
-              <a:t>02/12/2018</a:t>
+              <a:t>23/12/2018</a:t>
             </a:fld>
             <a:endParaRPr lang="fr-FR"/>
           </a:p>
@@ -1311,13 +1135,7 @@
       </p:sp>
       <p:sp>
         <p:nvSpPr>
-          <p:cNvPr id="6" name="Espace réservé du pied de page 5">
-            <a:extLst>
-              <a:ext uri="{FF2B5EF4-FFF2-40B4-BE49-F238E27FC236}">
-                <a16:creationId xmlns:a16="http://schemas.microsoft.com/office/drawing/2014/main" id="{2FB0905D-DFD5-9649-9D42-4CC9B766CA4A}"/>
-              </a:ext>
-            </a:extLst>
-          </p:cNvPr>
+          <p:cNvPr id="6" name="Footer Placeholder 5"/>
           <p:cNvSpPr>
             <a:spLocks noGrp="1"/>
           </p:cNvSpPr>
@@ -1336,13 +1154,7 @@
       </p:sp>
       <p:sp>
         <p:nvSpPr>
-          <p:cNvPr id="7" name="Espace réservé du numéro de diapositive 6">
-            <a:extLst>
-              <a:ext uri="{FF2B5EF4-FFF2-40B4-BE49-F238E27FC236}">
-                <a16:creationId xmlns:a16="http://schemas.microsoft.com/office/drawing/2014/main" id="{EF676A7A-6570-CD46-8196-4448CC9AB919}"/>
-              </a:ext>
-            </a:extLst>
-          </p:cNvPr>
+          <p:cNvPr id="7" name="Slide Number Placeholder 6"/>
           <p:cNvSpPr>
             <a:spLocks noGrp="1"/>
           </p:cNvSpPr>
@@ -1366,7 +1178,7 @@
     </p:spTree>
     <p:extLst>
       <p:ext uri="{BB962C8B-B14F-4D97-AF65-F5344CB8AC3E}">
-        <p14:creationId xmlns:p14="http://schemas.microsoft.com/office/powerpoint/2010/main" val="3207418564"/>
+        <p14:creationId xmlns:p14="http://schemas.microsoft.com/office/powerpoint/2010/main" val="297727663"/>
       </p:ext>
     </p:extLst>
   </p:cSld>
@@ -1395,13 +1207,7 @@
       </p:grpSpPr>
       <p:sp>
         <p:nvSpPr>
-          <p:cNvPr id="2" name="Titre 1">
-            <a:extLst>
-              <a:ext uri="{FF2B5EF4-FFF2-40B4-BE49-F238E27FC236}">
-                <a16:creationId xmlns:a16="http://schemas.microsoft.com/office/drawing/2014/main" id="{718CCC39-8F75-3942-A606-F949BB235C99}"/>
-              </a:ext>
-            </a:extLst>
-          </p:cNvPr>
+          <p:cNvPr id="2" name="Title 1"/>
           <p:cNvSpPr>
             <a:spLocks noGrp="1"/>
           </p:cNvSpPr>
@@ -1423,18 +1229,13 @@
               <a:rPr lang="fr-FR"/>
               <a:t>Modifiez le style du titre</a:t>
             </a:r>
-          </a:p>
-        </p:txBody>
-      </p:sp>
-      <p:sp>
-        <p:nvSpPr>
-          <p:cNvPr id="3" name="Espace réservé du texte 2">
-            <a:extLst>
-              <a:ext uri="{FF2B5EF4-FFF2-40B4-BE49-F238E27FC236}">
-                <a16:creationId xmlns:a16="http://schemas.microsoft.com/office/drawing/2014/main" id="{217BD91B-6C9D-9848-A974-C8099648CA3A}"/>
-              </a:ext>
-            </a:extLst>
-          </p:cNvPr>
+            <a:endParaRPr lang="en-US" dirty="0"/>
+          </a:p>
+        </p:txBody>
+      </p:sp>
+      <p:sp>
+        <p:nvSpPr>
+          <p:cNvPr id="3" name="Text Placeholder 2"/>
           <p:cNvSpPr>
             <a:spLocks noGrp="1"/>
           </p:cNvSpPr>
@@ -1489,6 +1290,7 @@
             </a:lvl9pPr>
           </a:lstStyle>
           <a:p>
+            <a:pPr lvl="0"/>
             <a:r>
               <a:rPr lang="fr-FR"/>
               <a:t>Modifier les styles du texte du masque
@@ -1497,18 +1299,13 @@
 Quatrième niveau
 Cinquième niveau</a:t>
             </a:r>
-          </a:p>
-        </p:txBody>
-      </p:sp>
-      <p:sp>
-        <p:nvSpPr>
-          <p:cNvPr id="4" name="Espace réservé du contenu 3">
-            <a:extLst>
-              <a:ext uri="{FF2B5EF4-FFF2-40B4-BE49-F238E27FC236}">
-                <a16:creationId xmlns:a16="http://schemas.microsoft.com/office/drawing/2014/main" id="{8112A2EF-E325-4E45-886C-A018F4321C57}"/>
-              </a:ext>
-            </a:extLst>
-          </p:cNvPr>
+            <a:endParaRPr lang="en-US" dirty="0"/>
+          </a:p>
+        </p:txBody>
+      </p:sp>
+      <p:sp>
+        <p:nvSpPr>
+          <p:cNvPr id="4" name="Content Placeholder 3"/>
           <p:cNvSpPr>
             <a:spLocks noGrp="1"/>
           </p:cNvSpPr>
@@ -1526,6 +1323,7 @@
           <a:bodyPr/>
           <a:lstStyle/>
           <a:p>
+            <a:pPr lvl="0"/>
             <a:r>
               <a:rPr lang="fr-FR"/>
               <a:t>Modifier les styles du texte du masque
@@ -1534,18 +1332,13 @@
 Quatrième niveau
 Cinquième niveau</a:t>
             </a:r>
-          </a:p>
-        </p:txBody>
-      </p:sp>
-      <p:sp>
-        <p:nvSpPr>
-          <p:cNvPr id="5" name="Espace réservé du texte 4">
-            <a:extLst>
-              <a:ext uri="{FF2B5EF4-FFF2-40B4-BE49-F238E27FC236}">
-                <a16:creationId xmlns:a16="http://schemas.microsoft.com/office/drawing/2014/main" id="{3AEF8AD4-18B2-2E40-B084-EFC451BEC1E8}"/>
-              </a:ext>
-            </a:extLst>
-          </p:cNvPr>
+            <a:endParaRPr lang="en-US" dirty="0"/>
+          </a:p>
+        </p:txBody>
+      </p:sp>
+      <p:sp>
+        <p:nvSpPr>
+          <p:cNvPr id="5" name="Text Placeholder 4"/>
           <p:cNvSpPr>
             <a:spLocks noGrp="1"/>
           </p:cNvSpPr>
@@ -1600,6 +1393,7 @@
             </a:lvl9pPr>
           </a:lstStyle>
           <a:p>
+            <a:pPr lvl="0"/>
             <a:r>
               <a:rPr lang="fr-FR"/>
               <a:t>Modifier les styles du texte du masque
@@ -1608,18 +1402,13 @@
 Quatrième niveau
 Cinquième niveau</a:t>
             </a:r>
-          </a:p>
-        </p:txBody>
-      </p:sp>
-      <p:sp>
-        <p:nvSpPr>
-          <p:cNvPr id="6" name="Espace réservé du contenu 5">
-            <a:extLst>
-              <a:ext uri="{FF2B5EF4-FFF2-40B4-BE49-F238E27FC236}">
-                <a16:creationId xmlns:a16="http://schemas.microsoft.com/office/drawing/2014/main" id="{176CD098-6DCB-C04D-96AB-3DD47C381BAA}"/>
-              </a:ext>
-            </a:extLst>
-          </p:cNvPr>
+            <a:endParaRPr lang="en-US" dirty="0"/>
+          </a:p>
+        </p:txBody>
+      </p:sp>
+      <p:sp>
+        <p:nvSpPr>
+          <p:cNvPr id="6" name="Content Placeholder 5"/>
           <p:cNvSpPr>
             <a:spLocks noGrp="1"/>
           </p:cNvSpPr>
@@ -1637,6 +1426,7 @@
           <a:bodyPr/>
           <a:lstStyle/>
           <a:p>
+            <a:pPr lvl="0"/>
             <a:r>
               <a:rPr lang="fr-FR"/>
               <a:t>Modifier les styles du texte du masque
@@ -1645,18 +1435,13 @@
 Quatrième niveau
 Cinquième niveau</a:t>
             </a:r>
-          </a:p>
-        </p:txBody>
-      </p:sp>
-      <p:sp>
-        <p:nvSpPr>
-          <p:cNvPr id="7" name="Espace réservé de la date 6">
-            <a:extLst>
-              <a:ext uri="{FF2B5EF4-FFF2-40B4-BE49-F238E27FC236}">
-                <a16:creationId xmlns:a16="http://schemas.microsoft.com/office/drawing/2014/main" id="{A55FC6B0-33C4-C246-9913-E44B0751DF98}"/>
-              </a:ext>
-            </a:extLst>
-          </p:cNvPr>
+            <a:endParaRPr lang="en-US" dirty="0"/>
+          </a:p>
+        </p:txBody>
+      </p:sp>
+      <p:sp>
+        <p:nvSpPr>
+          <p:cNvPr id="7" name="Date Placeholder 6"/>
           <p:cNvSpPr>
             <a:spLocks noGrp="1"/>
           </p:cNvSpPr>
@@ -1671,7 +1456,7 @@
           <a:p>
             <a:fld id="{5095E208-7D3B-7E40-8085-C5996EEE4BD8}" type="datetimeFigureOut">
               <a:rPr lang="fr-FR" smtClean="0"/>
-              <a:t>02/12/2018</a:t>
+              <a:t>23/12/2018</a:t>
             </a:fld>
             <a:endParaRPr lang="fr-FR"/>
           </a:p>
@@ -1679,13 +1464,7 @@
       </p:sp>
       <p:sp>
         <p:nvSpPr>
-          <p:cNvPr id="8" name="Espace réservé du pied de page 7">
-            <a:extLst>
-              <a:ext uri="{FF2B5EF4-FFF2-40B4-BE49-F238E27FC236}">
-                <a16:creationId xmlns:a16="http://schemas.microsoft.com/office/drawing/2014/main" id="{814C6139-841B-CD4F-9A6F-F17ED214FE27}"/>
-              </a:ext>
-            </a:extLst>
-          </p:cNvPr>
+          <p:cNvPr id="8" name="Footer Placeholder 7"/>
           <p:cNvSpPr>
             <a:spLocks noGrp="1"/>
           </p:cNvSpPr>
@@ -1704,13 +1483,7 @@
       </p:sp>
       <p:sp>
         <p:nvSpPr>
-          <p:cNvPr id="9" name="Espace réservé du numéro de diapositive 8">
-            <a:extLst>
-              <a:ext uri="{FF2B5EF4-FFF2-40B4-BE49-F238E27FC236}">
-                <a16:creationId xmlns:a16="http://schemas.microsoft.com/office/drawing/2014/main" id="{C9D6A618-82F5-AF4D-B029-BFFED6A7F271}"/>
-              </a:ext>
-            </a:extLst>
-          </p:cNvPr>
+          <p:cNvPr id="9" name="Slide Number Placeholder 8"/>
           <p:cNvSpPr>
             <a:spLocks noGrp="1"/>
           </p:cNvSpPr>
@@ -1734,7 +1507,7 @@
     </p:spTree>
     <p:extLst>
       <p:ext uri="{BB962C8B-B14F-4D97-AF65-F5344CB8AC3E}">
-        <p14:creationId xmlns:p14="http://schemas.microsoft.com/office/powerpoint/2010/main" val="4135138371"/>
+        <p14:creationId xmlns:p14="http://schemas.microsoft.com/office/powerpoint/2010/main" val="3212542388"/>
       </p:ext>
     </p:extLst>
   </p:cSld>
@@ -1763,13 +1536,7 @@
       </p:grpSpPr>
       <p:sp>
         <p:nvSpPr>
-          <p:cNvPr id="2" name="Titre 1">
-            <a:extLst>
-              <a:ext uri="{FF2B5EF4-FFF2-40B4-BE49-F238E27FC236}">
-                <a16:creationId xmlns:a16="http://schemas.microsoft.com/office/drawing/2014/main" id="{02689D4B-2D2B-CF4F-860C-AAF34386589D}"/>
-              </a:ext>
-            </a:extLst>
-          </p:cNvPr>
+          <p:cNvPr id="2" name="Title 1"/>
           <p:cNvSpPr>
             <a:spLocks noGrp="1"/>
           </p:cNvSpPr>
@@ -1786,18 +1553,13 @@
               <a:rPr lang="fr-FR"/>
               <a:t>Modifiez le style du titre</a:t>
             </a:r>
-          </a:p>
-        </p:txBody>
-      </p:sp>
-      <p:sp>
-        <p:nvSpPr>
-          <p:cNvPr id="3" name="Espace réservé de la date 2">
-            <a:extLst>
-              <a:ext uri="{FF2B5EF4-FFF2-40B4-BE49-F238E27FC236}">
-                <a16:creationId xmlns:a16="http://schemas.microsoft.com/office/drawing/2014/main" id="{23B7DAFE-BC84-1747-A2DE-717514337E92}"/>
-              </a:ext>
-            </a:extLst>
-          </p:cNvPr>
+            <a:endParaRPr lang="en-US" dirty="0"/>
+          </a:p>
+        </p:txBody>
+      </p:sp>
+      <p:sp>
+        <p:nvSpPr>
+          <p:cNvPr id="3" name="Date Placeholder 2"/>
           <p:cNvSpPr>
             <a:spLocks noGrp="1"/>
           </p:cNvSpPr>
@@ -1812,7 +1574,7 @@
           <a:p>
             <a:fld id="{5095E208-7D3B-7E40-8085-C5996EEE4BD8}" type="datetimeFigureOut">
               <a:rPr lang="fr-FR" smtClean="0"/>
-              <a:t>02/12/2018</a:t>
+              <a:t>23/12/2018</a:t>
             </a:fld>
             <a:endParaRPr lang="fr-FR"/>
           </a:p>
@@ -1820,13 +1582,7 @@
       </p:sp>
       <p:sp>
         <p:nvSpPr>
-          <p:cNvPr id="4" name="Espace réservé du pied de page 3">
-            <a:extLst>
-              <a:ext uri="{FF2B5EF4-FFF2-40B4-BE49-F238E27FC236}">
-                <a16:creationId xmlns:a16="http://schemas.microsoft.com/office/drawing/2014/main" id="{C6AD4D8B-DEA5-5146-93D0-94AB22E7DAB3}"/>
-              </a:ext>
-            </a:extLst>
-          </p:cNvPr>
+          <p:cNvPr id="4" name="Footer Placeholder 3"/>
           <p:cNvSpPr>
             <a:spLocks noGrp="1"/>
           </p:cNvSpPr>
@@ -1845,13 +1601,7 @@
       </p:sp>
       <p:sp>
         <p:nvSpPr>
-          <p:cNvPr id="5" name="Espace réservé du numéro de diapositive 4">
-            <a:extLst>
-              <a:ext uri="{FF2B5EF4-FFF2-40B4-BE49-F238E27FC236}">
-                <a16:creationId xmlns:a16="http://schemas.microsoft.com/office/drawing/2014/main" id="{DE1B484B-8327-1A43-B30C-0CD3D9FCBF8B}"/>
-              </a:ext>
-            </a:extLst>
-          </p:cNvPr>
+          <p:cNvPr id="5" name="Slide Number Placeholder 4"/>
           <p:cNvSpPr>
             <a:spLocks noGrp="1"/>
           </p:cNvSpPr>
@@ -1875,7 +1625,7 @@
     </p:spTree>
     <p:extLst>
       <p:ext uri="{BB962C8B-B14F-4D97-AF65-F5344CB8AC3E}">
-        <p14:creationId xmlns:p14="http://schemas.microsoft.com/office/powerpoint/2010/main" val="4151611051"/>
+        <p14:creationId xmlns:p14="http://schemas.microsoft.com/office/powerpoint/2010/main" val="744144516"/>
       </p:ext>
     </p:extLst>
   </p:cSld>
@@ -1904,13 +1654,7 @@
       </p:grpSpPr>
       <p:sp>
         <p:nvSpPr>
-          <p:cNvPr id="2" name="Espace réservé de la date 1">
-            <a:extLst>
-              <a:ext uri="{FF2B5EF4-FFF2-40B4-BE49-F238E27FC236}">
-                <a16:creationId xmlns:a16="http://schemas.microsoft.com/office/drawing/2014/main" id="{A35A9849-B6E6-4443-B6F8-1C84B8204C39}"/>
-              </a:ext>
-            </a:extLst>
-          </p:cNvPr>
+          <p:cNvPr id="2" name="Date Placeholder 1"/>
           <p:cNvSpPr>
             <a:spLocks noGrp="1"/>
           </p:cNvSpPr>
@@ -1925,7 +1669,7 @@
           <a:p>
             <a:fld id="{5095E208-7D3B-7E40-8085-C5996EEE4BD8}" type="datetimeFigureOut">
               <a:rPr lang="fr-FR" smtClean="0"/>
-              <a:t>02/12/2018</a:t>
+              <a:t>23/12/2018</a:t>
             </a:fld>
             <a:endParaRPr lang="fr-FR"/>
           </a:p>
@@ -1933,13 +1677,7 @@
       </p:sp>
       <p:sp>
         <p:nvSpPr>
-          <p:cNvPr id="3" name="Espace réservé du pied de page 2">
-            <a:extLst>
-              <a:ext uri="{FF2B5EF4-FFF2-40B4-BE49-F238E27FC236}">
-                <a16:creationId xmlns:a16="http://schemas.microsoft.com/office/drawing/2014/main" id="{308A9497-1EFB-1744-8A1D-0CB1222ED716}"/>
-              </a:ext>
-            </a:extLst>
-          </p:cNvPr>
+          <p:cNvPr id="3" name="Footer Placeholder 2"/>
           <p:cNvSpPr>
             <a:spLocks noGrp="1"/>
           </p:cNvSpPr>
@@ -1958,13 +1696,7 @@
       </p:sp>
       <p:sp>
         <p:nvSpPr>
-          <p:cNvPr id="4" name="Espace réservé du numéro de diapositive 3">
-            <a:extLst>
-              <a:ext uri="{FF2B5EF4-FFF2-40B4-BE49-F238E27FC236}">
-                <a16:creationId xmlns:a16="http://schemas.microsoft.com/office/drawing/2014/main" id="{FE4F2750-AF87-FC4D-9821-C4F3061C8A6E}"/>
-              </a:ext>
-            </a:extLst>
-          </p:cNvPr>
+          <p:cNvPr id="4" name="Slide Number Placeholder 3"/>
           <p:cNvSpPr>
             <a:spLocks noGrp="1"/>
           </p:cNvSpPr>
@@ -1988,7 +1720,7 @@
     </p:spTree>
     <p:extLst>
       <p:ext uri="{BB962C8B-B14F-4D97-AF65-F5344CB8AC3E}">
-        <p14:creationId xmlns:p14="http://schemas.microsoft.com/office/powerpoint/2010/main" val="525088317"/>
+        <p14:creationId xmlns:p14="http://schemas.microsoft.com/office/powerpoint/2010/main" val="977816898"/>
       </p:ext>
     </p:extLst>
   </p:cSld>
@@ -2017,13 +1749,7 @@
       </p:grpSpPr>
       <p:sp>
         <p:nvSpPr>
-          <p:cNvPr id="2" name="Titre 1">
-            <a:extLst>
-              <a:ext uri="{FF2B5EF4-FFF2-40B4-BE49-F238E27FC236}">
-                <a16:creationId xmlns:a16="http://schemas.microsoft.com/office/drawing/2014/main" id="{2485946F-0EA2-5943-BCEB-060D9A879D5A}"/>
-              </a:ext>
-            </a:extLst>
-          </p:cNvPr>
+          <p:cNvPr id="2" name="Title 1"/>
           <p:cNvSpPr>
             <a:spLocks noGrp="1"/>
           </p:cNvSpPr>
@@ -2049,18 +1775,13 @@
               <a:rPr lang="fr-FR"/>
               <a:t>Modifiez le style du titre</a:t>
             </a:r>
-          </a:p>
-        </p:txBody>
-      </p:sp>
-      <p:sp>
-        <p:nvSpPr>
-          <p:cNvPr id="3" name="Espace réservé du contenu 2">
-            <a:extLst>
-              <a:ext uri="{FF2B5EF4-FFF2-40B4-BE49-F238E27FC236}">
-                <a16:creationId xmlns:a16="http://schemas.microsoft.com/office/drawing/2014/main" id="{B0A73E47-3941-AB47-A45E-BF04522A38C1}"/>
-              </a:ext>
-            </a:extLst>
-          </p:cNvPr>
+            <a:endParaRPr lang="en-US" dirty="0"/>
+          </a:p>
+        </p:txBody>
+      </p:sp>
+      <p:sp>
+        <p:nvSpPr>
+          <p:cNvPr id="3" name="Content Placeholder 2"/>
           <p:cNvSpPr>
             <a:spLocks noGrp="1"/>
           </p:cNvSpPr>
@@ -2106,6 +1827,7 @@
             </a:lvl9pPr>
           </a:lstStyle>
           <a:p>
+            <a:pPr lvl="0"/>
             <a:r>
               <a:rPr lang="fr-FR"/>
               <a:t>Modifier les styles du texte du masque
@@ -2114,18 +1836,13 @@
 Quatrième niveau
 Cinquième niveau</a:t>
             </a:r>
-          </a:p>
-        </p:txBody>
-      </p:sp>
-      <p:sp>
-        <p:nvSpPr>
-          <p:cNvPr id="4" name="Espace réservé du texte 3">
-            <a:extLst>
-              <a:ext uri="{FF2B5EF4-FFF2-40B4-BE49-F238E27FC236}">
-                <a16:creationId xmlns:a16="http://schemas.microsoft.com/office/drawing/2014/main" id="{D20F927A-7779-7E4A-A131-3CEEDE724358}"/>
-              </a:ext>
-            </a:extLst>
-          </p:cNvPr>
+            <a:endParaRPr lang="en-US" dirty="0"/>
+          </a:p>
+        </p:txBody>
+      </p:sp>
+      <p:sp>
+        <p:nvSpPr>
+          <p:cNvPr id="4" name="Text Placeholder 3"/>
           <p:cNvSpPr>
             <a:spLocks noGrp="1"/>
           </p:cNvSpPr>
@@ -2180,6 +1897,7 @@
             </a:lvl9pPr>
           </a:lstStyle>
           <a:p>
+            <a:pPr lvl="0"/>
             <a:r>
               <a:rPr lang="fr-FR"/>
               <a:t>Modifier les styles du texte du masque
@@ -2188,18 +1906,13 @@
 Quatrième niveau
 Cinquième niveau</a:t>
             </a:r>
-          </a:p>
-        </p:txBody>
-      </p:sp>
-      <p:sp>
-        <p:nvSpPr>
-          <p:cNvPr id="5" name="Espace réservé de la date 4">
-            <a:extLst>
-              <a:ext uri="{FF2B5EF4-FFF2-40B4-BE49-F238E27FC236}">
-                <a16:creationId xmlns:a16="http://schemas.microsoft.com/office/drawing/2014/main" id="{2AA08C3D-D580-9747-9B56-A95BC2A1E785}"/>
-              </a:ext>
-            </a:extLst>
-          </p:cNvPr>
+            <a:endParaRPr lang="en-US" dirty="0"/>
+          </a:p>
+        </p:txBody>
+      </p:sp>
+      <p:sp>
+        <p:nvSpPr>
+          <p:cNvPr id="5" name="Date Placeholder 4"/>
           <p:cNvSpPr>
             <a:spLocks noGrp="1"/>
           </p:cNvSpPr>
@@ -2214,7 +1927,7 @@
           <a:p>
             <a:fld id="{5095E208-7D3B-7E40-8085-C5996EEE4BD8}" type="datetimeFigureOut">
               <a:rPr lang="fr-FR" smtClean="0"/>
-              <a:t>02/12/2018</a:t>
+              <a:t>23/12/2018</a:t>
             </a:fld>
             <a:endParaRPr lang="fr-FR"/>
           </a:p>
@@ -2222,13 +1935,7 @@
       </p:sp>
       <p:sp>
         <p:nvSpPr>
-          <p:cNvPr id="6" name="Espace réservé du pied de page 5">
-            <a:extLst>
-              <a:ext uri="{FF2B5EF4-FFF2-40B4-BE49-F238E27FC236}">
-                <a16:creationId xmlns:a16="http://schemas.microsoft.com/office/drawing/2014/main" id="{E8FC10F5-FE00-C740-99BB-6551775EDAB7}"/>
-              </a:ext>
-            </a:extLst>
-          </p:cNvPr>
+          <p:cNvPr id="6" name="Footer Placeholder 5"/>
           <p:cNvSpPr>
             <a:spLocks noGrp="1"/>
           </p:cNvSpPr>
@@ -2247,13 +1954,7 @@
       </p:sp>
       <p:sp>
         <p:nvSpPr>
-          <p:cNvPr id="7" name="Espace réservé du numéro de diapositive 6">
-            <a:extLst>
-              <a:ext uri="{FF2B5EF4-FFF2-40B4-BE49-F238E27FC236}">
-                <a16:creationId xmlns:a16="http://schemas.microsoft.com/office/drawing/2014/main" id="{A7D1A53D-5308-1F41-BF1D-6B51746CE106}"/>
-              </a:ext>
-            </a:extLst>
-          </p:cNvPr>
+          <p:cNvPr id="7" name="Slide Number Placeholder 6"/>
           <p:cNvSpPr>
             <a:spLocks noGrp="1"/>
           </p:cNvSpPr>
@@ -2277,7 +1978,7 @@
     </p:spTree>
     <p:extLst>
       <p:ext uri="{BB962C8B-B14F-4D97-AF65-F5344CB8AC3E}">
-        <p14:creationId xmlns:p14="http://schemas.microsoft.com/office/powerpoint/2010/main" val="1278790178"/>
+        <p14:creationId xmlns:p14="http://schemas.microsoft.com/office/powerpoint/2010/main" val="1171895408"/>
       </p:ext>
     </p:extLst>
   </p:cSld>
@@ -2306,13 +2007,7 @@
       </p:grpSpPr>
       <p:sp>
         <p:nvSpPr>
-          <p:cNvPr id="2" name="Titre 1">
-            <a:extLst>
-              <a:ext uri="{FF2B5EF4-FFF2-40B4-BE49-F238E27FC236}">
-                <a16:creationId xmlns:a16="http://schemas.microsoft.com/office/drawing/2014/main" id="{709553FD-34CA-9D46-8B64-0F2D7604FE85}"/>
-              </a:ext>
-            </a:extLst>
-          </p:cNvPr>
+          <p:cNvPr id="2" name="Title 1"/>
           <p:cNvSpPr>
             <a:spLocks noGrp="1"/>
           </p:cNvSpPr>
@@ -2338,20 +2033,15 @@
               <a:rPr lang="fr-FR"/>
               <a:t>Modifiez le style du titre</a:t>
             </a:r>
-          </a:p>
-        </p:txBody>
-      </p:sp>
-      <p:sp>
-        <p:nvSpPr>
-          <p:cNvPr id="3" name="Espace réservé pour une image  2">
-            <a:extLst>
-              <a:ext uri="{FF2B5EF4-FFF2-40B4-BE49-F238E27FC236}">
-                <a16:creationId xmlns:a16="http://schemas.microsoft.com/office/drawing/2014/main" id="{59CD2CE4-F68C-B04A-BC08-A1620C46D52C}"/>
-              </a:ext>
-            </a:extLst>
-          </p:cNvPr>
-          <p:cNvSpPr>
-            <a:spLocks noGrp="1"/>
+            <a:endParaRPr lang="en-US" dirty="0"/>
+          </a:p>
+        </p:txBody>
+      </p:sp>
+      <p:sp>
+        <p:nvSpPr>
+          <p:cNvPr id="3" name="Picture Placeholder 2"/>
+          <p:cNvSpPr>
+            <a:spLocks noGrp="1" noChangeAspect="1"/>
           </p:cNvSpPr>
           <p:nvPr>
             <p:ph type="pic" idx="1"/>
@@ -2364,7 +2054,7 @@
           </a:xfrm>
         </p:spPr>
         <p:txBody>
-          <a:bodyPr/>
+          <a:bodyPr anchor="t"/>
           <a:lstStyle>
             <a:lvl1pPr marL="0" indent="0">
               <a:buNone/>
@@ -2404,19 +2094,17 @@
             </a:lvl9pPr>
           </a:lstStyle>
           <a:p>
-            <a:endParaRPr lang="fr-FR"/>
-          </a:p>
-        </p:txBody>
-      </p:sp>
-      <p:sp>
-        <p:nvSpPr>
-          <p:cNvPr id="4" name="Espace réservé du texte 3">
-            <a:extLst>
-              <a:ext uri="{FF2B5EF4-FFF2-40B4-BE49-F238E27FC236}">
-                <a16:creationId xmlns:a16="http://schemas.microsoft.com/office/drawing/2014/main" id="{E7CEC464-F71A-5642-895B-E4B9BD8253DC}"/>
-              </a:ext>
-            </a:extLst>
-          </p:cNvPr>
+            <a:r>
+              <a:rPr lang="fr-FR"/>
+              <a:t>Cliquez sur l'icône pour ajouter une image</a:t>
+            </a:r>
+            <a:endParaRPr lang="en-US" dirty="0"/>
+          </a:p>
+        </p:txBody>
+      </p:sp>
+      <p:sp>
+        <p:nvSpPr>
+          <p:cNvPr id="4" name="Text Placeholder 3"/>
           <p:cNvSpPr>
             <a:spLocks noGrp="1"/>
           </p:cNvSpPr>
@@ -2471,6 +2159,7 @@
             </a:lvl9pPr>
           </a:lstStyle>
           <a:p>
+            <a:pPr lvl="0"/>
             <a:r>
               <a:rPr lang="fr-FR"/>
               <a:t>Modifier les styles du texte du masque
@@ -2479,18 +2168,13 @@
 Quatrième niveau
 Cinquième niveau</a:t>
             </a:r>
-          </a:p>
-        </p:txBody>
-      </p:sp>
-      <p:sp>
-        <p:nvSpPr>
-          <p:cNvPr id="5" name="Espace réservé de la date 4">
-            <a:extLst>
-              <a:ext uri="{FF2B5EF4-FFF2-40B4-BE49-F238E27FC236}">
-                <a16:creationId xmlns:a16="http://schemas.microsoft.com/office/drawing/2014/main" id="{4C4A3058-BD7A-5946-9609-18E00D79AD1F}"/>
-              </a:ext>
-            </a:extLst>
-          </p:cNvPr>
+            <a:endParaRPr lang="en-US" dirty="0"/>
+          </a:p>
+        </p:txBody>
+      </p:sp>
+      <p:sp>
+        <p:nvSpPr>
+          <p:cNvPr id="5" name="Date Placeholder 4"/>
           <p:cNvSpPr>
             <a:spLocks noGrp="1"/>
           </p:cNvSpPr>
@@ -2505,7 +2189,7 @@
           <a:p>
             <a:fld id="{5095E208-7D3B-7E40-8085-C5996EEE4BD8}" type="datetimeFigureOut">
               <a:rPr lang="fr-FR" smtClean="0"/>
-              <a:t>02/12/2018</a:t>
+              <a:t>23/12/2018</a:t>
             </a:fld>
             <a:endParaRPr lang="fr-FR"/>
           </a:p>
@@ -2513,13 +2197,7 @@
       </p:sp>
       <p:sp>
         <p:nvSpPr>
-          <p:cNvPr id="6" name="Espace réservé du pied de page 5">
-            <a:extLst>
-              <a:ext uri="{FF2B5EF4-FFF2-40B4-BE49-F238E27FC236}">
-                <a16:creationId xmlns:a16="http://schemas.microsoft.com/office/drawing/2014/main" id="{0AE5A202-4D54-BB43-9B79-F3D853C468F7}"/>
-              </a:ext>
-            </a:extLst>
-          </p:cNvPr>
+          <p:cNvPr id="6" name="Footer Placeholder 5"/>
           <p:cNvSpPr>
             <a:spLocks noGrp="1"/>
           </p:cNvSpPr>
@@ -2538,13 +2216,7 @@
       </p:sp>
       <p:sp>
         <p:nvSpPr>
-          <p:cNvPr id="7" name="Espace réservé du numéro de diapositive 6">
-            <a:extLst>
-              <a:ext uri="{FF2B5EF4-FFF2-40B4-BE49-F238E27FC236}">
-                <a16:creationId xmlns:a16="http://schemas.microsoft.com/office/drawing/2014/main" id="{230D46AC-401A-364E-8400-BE4C740DA3E4}"/>
-              </a:ext>
-            </a:extLst>
-          </p:cNvPr>
+          <p:cNvPr id="7" name="Slide Number Placeholder 6"/>
           <p:cNvSpPr>
             <a:spLocks noGrp="1"/>
           </p:cNvSpPr>
@@ -2568,7 +2240,7 @@
     </p:spTree>
     <p:extLst>
       <p:ext uri="{BB962C8B-B14F-4D97-AF65-F5344CB8AC3E}">
-        <p14:creationId xmlns:p14="http://schemas.microsoft.com/office/powerpoint/2010/main" val="12402488"/>
+        <p14:creationId xmlns:p14="http://schemas.microsoft.com/office/powerpoint/2010/main" val="2121186889"/>
       </p:ext>
     </p:extLst>
   </p:cSld>
@@ -2602,13 +2274,7 @@
       </p:grpSpPr>
       <p:sp>
         <p:nvSpPr>
-          <p:cNvPr id="2" name="Espace réservé du titre 1">
-            <a:extLst>
-              <a:ext uri="{FF2B5EF4-FFF2-40B4-BE49-F238E27FC236}">
-                <a16:creationId xmlns:a16="http://schemas.microsoft.com/office/drawing/2014/main" id="{72A932BC-6283-F040-8605-517FCD9E49EF}"/>
-              </a:ext>
-            </a:extLst>
-          </p:cNvPr>
+          <p:cNvPr id="2" name="Title Placeholder 1"/>
           <p:cNvSpPr>
             <a:spLocks noGrp="1"/>
           </p:cNvSpPr>
@@ -2635,18 +2301,13 @@
               <a:rPr lang="fr-FR"/>
               <a:t>Modifiez le style du titre</a:t>
             </a:r>
-          </a:p>
-        </p:txBody>
-      </p:sp>
-      <p:sp>
-        <p:nvSpPr>
-          <p:cNvPr id="3" name="Espace réservé du texte 2">
-            <a:extLst>
-              <a:ext uri="{FF2B5EF4-FFF2-40B4-BE49-F238E27FC236}">
-                <a16:creationId xmlns:a16="http://schemas.microsoft.com/office/drawing/2014/main" id="{D8164FFE-9083-EA49-B870-840310238AA5}"/>
-              </a:ext>
-            </a:extLst>
-          </p:cNvPr>
+            <a:endParaRPr lang="en-US" dirty="0"/>
+          </a:p>
+        </p:txBody>
+      </p:sp>
+      <p:sp>
+        <p:nvSpPr>
+          <p:cNvPr id="3" name="Text Placeholder 2"/>
           <p:cNvSpPr>
             <a:spLocks noGrp="1"/>
           </p:cNvSpPr>
@@ -2669,6 +2330,7 @@
           </a:bodyPr>
           <a:lstStyle/>
           <a:p>
+            <a:pPr lvl="0"/>
             <a:r>
               <a:rPr lang="fr-FR"/>
               <a:t>Modifier les styles du texte du masque
@@ -2677,18 +2339,13 @@
 Quatrième niveau
 Cinquième niveau</a:t>
             </a:r>
-          </a:p>
-        </p:txBody>
-      </p:sp>
-      <p:sp>
-        <p:nvSpPr>
-          <p:cNvPr id="4" name="Espace réservé de la date 3">
-            <a:extLst>
-              <a:ext uri="{FF2B5EF4-FFF2-40B4-BE49-F238E27FC236}">
-                <a16:creationId xmlns:a16="http://schemas.microsoft.com/office/drawing/2014/main" id="{5F8C0658-80AC-2A4A-8399-4D27E5E60948}"/>
-              </a:ext>
-            </a:extLst>
-          </p:cNvPr>
+            <a:endParaRPr lang="en-US" dirty="0"/>
+          </a:p>
+        </p:txBody>
+      </p:sp>
+      <p:sp>
+        <p:nvSpPr>
+          <p:cNvPr id="4" name="Date Placeholder 3"/>
           <p:cNvSpPr>
             <a:spLocks noGrp="1"/>
           </p:cNvSpPr>
@@ -2721,7 +2378,7 @@
           <a:p>
             <a:fld id="{5095E208-7D3B-7E40-8085-C5996EEE4BD8}" type="datetimeFigureOut">
               <a:rPr lang="fr-FR" smtClean="0"/>
-              <a:t>02/12/2018</a:t>
+              <a:t>23/12/2018</a:t>
             </a:fld>
             <a:endParaRPr lang="fr-FR"/>
           </a:p>
@@ -2729,13 +2386,7 @@
       </p:sp>
       <p:sp>
         <p:nvSpPr>
-          <p:cNvPr id="5" name="Espace réservé du pied de page 4">
-            <a:extLst>
-              <a:ext uri="{FF2B5EF4-FFF2-40B4-BE49-F238E27FC236}">
-                <a16:creationId xmlns:a16="http://schemas.microsoft.com/office/drawing/2014/main" id="{88C7D97A-E02F-824B-A167-80D500B5973F}"/>
-              </a:ext>
-            </a:extLst>
-          </p:cNvPr>
+          <p:cNvPr id="5" name="Footer Placeholder 4"/>
           <p:cNvSpPr>
             <a:spLocks noGrp="1"/>
           </p:cNvSpPr>
@@ -2772,13 +2423,7 @@
       </p:sp>
       <p:sp>
         <p:nvSpPr>
-          <p:cNvPr id="6" name="Espace réservé du numéro de diapositive 5">
-            <a:extLst>
-              <a:ext uri="{FF2B5EF4-FFF2-40B4-BE49-F238E27FC236}">
-                <a16:creationId xmlns:a16="http://schemas.microsoft.com/office/drawing/2014/main" id="{2A8DE1F9-7DCC-0B48-8212-A18A530C2369}"/>
-              </a:ext>
-            </a:extLst>
-          </p:cNvPr>
+          <p:cNvPr id="6" name="Slide Number Placeholder 5"/>
           <p:cNvSpPr>
             <a:spLocks noGrp="1"/>
           </p:cNvSpPr>
@@ -2820,23 +2465,23 @@
     </p:spTree>
     <p:extLst>
       <p:ext uri="{BB962C8B-B14F-4D97-AF65-F5344CB8AC3E}">
-        <p14:creationId xmlns:p14="http://schemas.microsoft.com/office/powerpoint/2010/main" val="1648705574"/>
+        <p14:creationId xmlns:p14="http://schemas.microsoft.com/office/powerpoint/2010/main" val="2889321969"/>
       </p:ext>
     </p:extLst>
   </p:cSld>
-  <p:clrMap bg1="lt1" tx1="dk1" bg2="lt2" tx2="dk2" accent1="accent1" accent2="accent2" accent3="accent3" accent4="accent4" accent5="accent5" accent6="accent6" hlink="hlink" folHlink="folHlink"/>
+  <p:clrMap bg1="dk1" tx1="lt1" bg2="dk2" tx2="lt2" accent1="accent1" accent2="accent2" accent3="accent3" accent4="accent4" accent5="accent5" accent6="accent6" hlink="hlink" folHlink="folHlink"/>
   <p:sldLayoutIdLst>
-    <p:sldLayoutId id="2147483649" r:id="rId1"/>
-    <p:sldLayoutId id="2147483650" r:id="rId2"/>
-    <p:sldLayoutId id="2147483651" r:id="rId3"/>
-    <p:sldLayoutId id="2147483652" r:id="rId4"/>
-    <p:sldLayoutId id="2147483653" r:id="rId5"/>
-    <p:sldLayoutId id="2147483654" r:id="rId6"/>
-    <p:sldLayoutId id="2147483655" r:id="rId7"/>
-    <p:sldLayoutId id="2147483656" r:id="rId8"/>
-    <p:sldLayoutId id="2147483657" r:id="rId9"/>
-    <p:sldLayoutId id="2147483658" r:id="rId10"/>
-    <p:sldLayoutId id="2147483659" r:id="rId11"/>
+    <p:sldLayoutId id="2147483673" r:id="rId1"/>
+    <p:sldLayoutId id="2147483674" r:id="rId2"/>
+    <p:sldLayoutId id="2147483675" r:id="rId3"/>
+    <p:sldLayoutId id="2147483676" r:id="rId4"/>
+    <p:sldLayoutId id="2147483677" r:id="rId5"/>
+    <p:sldLayoutId id="2147483678" r:id="rId6"/>
+    <p:sldLayoutId id="2147483679" r:id="rId7"/>
+    <p:sldLayoutId id="2147483680" r:id="rId8"/>
+    <p:sldLayoutId id="2147483681" r:id="rId9"/>
+    <p:sldLayoutId id="2147483682" r:id="rId10"/>
+    <p:sldLayoutId id="2147483683" r:id="rId11"/>
   </p:sldLayoutIdLst>
   <p:txStyles>
     <p:titleStyle>
@@ -3024,7 +2669,7 @@
     </p:bodyStyle>
     <p:otherStyle>
       <a:defPPr>
-        <a:defRPr lang="fr-FR"/>
+        <a:defRPr lang="en-US"/>
       </a:defPPr>
       <a:lvl1pPr marL="0" algn="l" defTabSz="914400" rtl="0" eaLnBrk="1" latinLnBrk="0" hangingPunct="1">
         <a:defRPr sz="1800" kern="1200">
@@ -3124,6 +2769,17 @@
 <file path=ppt/slides/slide1.xml><?xml version="1.0" encoding="utf-8"?>
 <p:sld xmlns:a="http://schemas.openxmlformats.org/drawingml/2006/main" xmlns:r="http://schemas.openxmlformats.org/officeDocument/2006/relationships" xmlns:p="http://schemas.openxmlformats.org/presentationml/2006/main">
   <p:cSld>
+    <p:bg>
+      <p:bgPr>
+        <a:solidFill>
+          <a:schemeClr val="accent5">
+            <a:lumMod val="60000"/>
+            <a:lumOff val="40000"/>
+          </a:schemeClr>
+        </a:solidFill>
+        <a:effectLst/>
+      </p:bgPr>
+    </p:bg>
     <p:spTree>
       <p:nvGrpSpPr>
         <p:cNvPr id="1" name=""/>
@@ -3140,10 +2796,10 @@
       </p:grpSpPr>
       <p:sp>
         <p:nvSpPr>
-          <p:cNvPr id="3" name="Sous-titre 2">
+          <p:cNvPr id="2" name="Titre 1">
             <a:extLst>
               <a:ext uri="{FF2B5EF4-FFF2-40B4-BE49-F238E27FC236}">
-                <a16:creationId xmlns:a16="http://schemas.microsoft.com/office/drawing/2014/main" id="{429CFE60-BBBA-B543-91E5-42C7F5D17863}"/>
+                <a16:creationId xmlns:a16="http://schemas.microsoft.com/office/drawing/2014/main" id="{4FE04526-CA41-1C4D-9C1B-50145000A95F}"/>
               </a:ext>
             </a:extLst>
           </p:cNvPr>
@@ -3151,257 +2807,318 @@
             <a:spLocks noGrp="1"/>
           </p:cNvSpPr>
           <p:nvPr>
-            <p:ph type="subTitle" idx="1"/>
+            <p:ph type="title"/>
           </p:nvPr>
         </p:nvSpPr>
         <p:spPr>
           <a:xfrm>
-            <a:off x="2044450" y="1160462"/>
-            <a:ext cx="9144000" cy="4111531"/>
+            <a:off x="6128539" y="802955"/>
+            <a:ext cx="4977976" cy="1454051"/>
           </a:xfrm>
         </p:spPr>
         <p:txBody>
-          <a:bodyPr/>
-          <a:lstStyle/>
-          <a:p>
+          <a:bodyPr>
+            <a:normAutofit/>
+          </a:bodyPr>
+          <a:lstStyle/>
+          <a:p>
+            <a:pPr algn="ctr"/>
             <a:r>
-              <a:rPr lang="fr-FR" b="1" dirty="0">
+              <a:rPr lang="fr-FR" altLang="fr-FR" sz="6000" b="1" dirty="0">
+                <a:solidFill>
+                  <a:srgbClr val="000000"/>
+                </a:solidFill>
                 <a:latin typeface="Heiti TC Medium" pitchFamily="2" charset="-128"/>
+                <a:ea typeface="Heiti TC Medium" pitchFamily="2" charset="-128"/>
+                <a:cs typeface="Brush Script MT" panose="03060802040406070304" pitchFamily="66" charset="-122"/>
+              </a:rPr>
+              <a:t>OC Pizza</a:t>
+            </a:r>
+          </a:p>
+          <a:p>
+            <a:endParaRPr lang="fr-FR" dirty="0">
+              <a:solidFill>
+                <a:srgbClr val="000000"/>
+              </a:solidFill>
+            </a:endParaRPr>
+          </a:p>
+        </p:txBody>
+      </p:sp>
+      <p:sp>
+        <p:nvSpPr>
+          <p:cNvPr id="10" name="Content Placeholder 9">
+            <a:extLst>
+              <a:ext uri="{FF2B5EF4-FFF2-40B4-BE49-F238E27FC236}">
+                <a16:creationId xmlns:a16="http://schemas.microsoft.com/office/drawing/2014/main" id="{E4E75652-9960-497F-92B9-DD9303BA0116}"/>
+              </a:ext>
+            </a:extLst>
+          </p:cNvPr>
+          <p:cNvSpPr>
+            <a:spLocks noGrp="1"/>
+          </p:cNvSpPr>
+          <p:nvPr>
+            <p:ph idx="1"/>
+          </p:nvPr>
+        </p:nvSpPr>
+        <p:spPr>
+          <a:xfrm>
+            <a:off x="5306291" y="2257006"/>
+            <a:ext cx="6622473" cy="4185358"/>
+          </a:xfrm>
+        </p:spPr>
+        <p:txBody>
+          <a:bodyPr anchor="ctr">
+            <a:normAutofit fontScale="85000" lnSpcReduction="10000"/>
+          </a:bodyPr>
+          <a:lstStyle/>
+          <a:p>
+            <a:pPr>
+              <a:lnSpc>
+                <a:spcPct val="170000"/>
+              </a:lnSpc>
+            </a:pPr>
+            <a:r>
+              <a:rPr lang="fr-FR" dirty="0">
+                <a:solidFill>
+                  <a:schemeClr val="bg1"/>
+                </a:solidFill>
+                <a:latin typeface="Lucida Calligraphy" panose="03010101010101010101" pitchFamily="66" charset="77"/>
                 <a:ea typeface="Heiti TC Medium" pitchFamily="2" charset="-128"/>
               </a:rPr>
               <a:t>Projet 4 Openclassrooms : Analysez les besoins de votre client pour son groupe de pizzerias</a:t>
             </a:r>
           </a:p>
           <a:p>
-            <a:endParaRPr lang="fr-FR" b="1" dirty="0"/>
-          </a:p>
-          <a:p>
+            <a:pPr>
+              <a:lnSpc>
+                <a:spcPct val="170000"/>
+              </a:lnSpc>
+            </a:pPr>
+            <a:endParaRPr lang="fr-FR" dirty="0">
+              <a:solidFill>
+                <a:schemeClr val="bg1"/>
+              </a:solidFill>
+              <a:latin typeface="Lucida Calligraphy" panose="03010101010101010101" pitchFamily="66" charset="77"/>
+              <a:ea typeface="Heiti TC Medium" pitchFamily="2" charset="-128"/>
+            </a:endParaRPr>
+          </a:p>
+          <a:p>
+            <a:pPr>
+              <a:lnSpc>
+                <a:spcPct val="170000"/>
+              </a:lnSpc>
+            </a:pPr>
             <a:r>
-              <a:rPr lang="fr-FR" altLang="fr-FR" sz="5400" b="1" dirty="0">
+              <a:rPr lang="fr-FR" dirty="0">
                 <a:solidFill>
-                  <a:srgbClr val="000000"/>
+                  <a:schemeClr val="bg1"/>
                 </a:solidFill>
-                <a:latin typeface="Calibri" panose="020F0502020204030204" pitchFamily="34" charset="0"/>
-                <a:ea typeface="Heiti SC Medium" pitchFamily="2" charset="-128"/>
-                <a:cs typeface="Brush Script MT" panose="03060802040406070304" pitchFamily="66" charset="-122"/>
-              </a:rPr>
-              <a:t>C Pizza</a:t>
-            </a:r>
-          </a:p>
-          <a:p>
-            <a:endParaRPr lang="fr-FR" altLang="fr-FR" sz="5400" b="1" dirty="0">
-              <a:solidFill>
-                <a:srgbClr val="000000"/>
-              </a:solidFill>
-              <a:latin typeface="Calibri" panose="020F0502020204030204" pitchFamily="34" charset="0"/>
-              <a:ea typeface="Heiti SC Medium" pitchFamily="2" charset="-128"/>
-              <a:cs typeface="Brush Script MT" panose="03060802040406070304" pitchFamily="66" charset="-122"/>
-            </a:endParaRPr>
-          </a:p>
-          <a:p>
-            <a:r>
-              <a:rPr lang="fr-FR" b="1" dirty="0">
-                <a:latin typeface="Heiti TC Medium" pitchFamily="2" charset="-128"/>
+                <a:latin typeface="Lucida Calligraphy" panose="03010101010101010101" pitchFamily="66" charset="77"/>
                 <a:ea typeface="Heiti TC Medium" pitchFamily="2" charset="-128"/>
               </a:rPr>
-              <a:t>Document (PDF) des spécifications fonctionnelles</a:t>
+              <a:t>Document (PowerPoint) de la solution fonctionnelle et technique retenue</a:t>
             </a:r>
-            <a:endParaRPr lang="fr-FR" altLang="fr-FR" b="1" dirty="0">
-              <a:latin typeface="Heiti TC Medium" pitchFamily="2" charset="-128"/>
+            <a:endParaRPr lang="en-US" dirty="0">
+              <a:solidFill>
+                <a:schemeClr val="bg1"/>
+              </a:solidFill>
+              <a:latin typeface="Lucida Calligraphy" panose="03010101010101010101" pitchFamily="66" charset="77"/>
               <a:ea typeface="Heiti TC Medium" pitchFamily="2" charset="-128"/>
             </a:endParaRPr>
           </a:p>
-          <a:p>
-            <a:endParaRPr lang="fr-FR" b="1" dirty="0"/>
-          </a:p>
-          <a:p>
-            <a:endParaRPr lang="fr-FR" dirty="0"/>
-          </a:p>
-        </p:txBody>
-      </p:sp>
-      <mc:AlternateContent xmlns:mc="http://schemas.openxmlformats.org/markup-compatibility/2006">
-        <mc:Choice xmlns:p14="http://schemas.microsoft.com/office/powerpoint/2010/main" Requires="p14">
-          <p:contentPart p14:bwMode="auto" r:id="rId2">
-            <p14:nvContentPartPr>
-              <p14:cNvPr id="10" name="Encre 9">
-                <a:extLst>
-                  <a:ext uri="{FF2B5EF4-FFF2-40B4-BE49-F238E27FC236}">
-                    <a16:creationId xmlns:a16="http://schemas.microsoft.com/office/drawing/2014/main" id="{938A19D1-3E43-7A47-9EAB-A327DF4CEDC7}"/>
-                  </a:ext>
-                </a:extLst>
-              </p14:cNvPr>
-              <p14:cNvContentPartPr/>
-              <p14:nvPr/>
-            </p14:nvContentPartPr>
-            <p14:xfrm>
-              <a:off x="-2067971" y="7726045"/>
-              <a:ext cx="0" cy="0"/>
-            </p14:xfrm>
-          </p:contentPart>
-        </mc:Choice>
-        <mc:Fallback>
-          <p:pic>
-            <p:nvPicPr>
-              <p:cNvPr id="10" name="Encre 9">
-                <a:extLst>
-                  <a:ext uri="{FF2B5EF4-FFF2-40B4-BE49-F238E27FC236}">
-                    <a16:creationId xmlns:a16="http://schemas.microsoft.com/office/drawing/2014/main" id="{938A19D1-3E43-7A47-9EAB-A327DF4CEDC7}"/>
-                  </a:ext>
-                </a:extLst>
-              </p:cNvPr>
-              <p:cNvPicPr/>
-              <p:nvPr/>
-            </p:nvPicPr>
-            <p:blipFill>
-              <a:blip r:embed="rId3"/>
-              <a:stretch>
-                <a:fillRect/>
-              </a:stretch>
-            </p:blipFill>
-            <p:spPr>
-              <a:xfrm>
-                <a:off x="-2067971" y="7726045"/>
-                <a:ext cx="0" cy="0"/>
-              </a:xfrm>
-              <a:prstGeom prst="rect">
-                <a:avLst/>
-              </a:prstGeom>
-            </p:spPr>
-          </p:pic>
-        </mc:Fallback>
-      </mc:AlternateContent>
-      <p:sp>
-        <p:nvSpPr>
-          <p:cNvPr id="8" name="Rectangle 8">
+        </p:txBody>
+      </p:sp>
+      <p:pic>
+        <p:nvPicPr>
+          <p:cNvPr id="8" name="Espace réservé du contenu 3">
             <a:extLst>
               <a:ext uri="{FF2B5EF4-FFF2-40B4-BE49-F238E27FC236}">
-                <a16:creationId xmlns:a16="http://schemas.microsoft.com/office/drawing/2014/main" id="{DE2E8100-951B-C34D-A5B8-5A8DFE0FB526}"/>
+                <a16:creationId xmlns:a16="http://schemas.microsoft.com/office/drawing/2014/main" id="{AF2D4D6B-A7F5-C845-A6E5-41243F879A60}"/>
               </a:ext>
             </a:extLst>
           </p:cNvPr>
-          <p:cNvSpPr>
-            <a:spLocks noChangeArrowheads="1"/>
-          </p:cNvSpPr>
+          <p:cNvPicPr>
+            <a:picLocks/>
+          </p:cNvPicPr>
           <p:nvPr/>
-        </p:nvSpPr>
-        <p:spPr bwMode="auto">
+        </p:nvPicPr>
+        <p:blipFill rotWithShape="1">
+          <a:blip r:embed="rId2">
+            <a:alphaModFix/>
+          </a:blip>
+          <a:srcRect l="3223" r="1232" b="-3"/>
+          <a:stretch/>
+        </p:blipFill>
+        <p:spPr>
           <a:xfrm>
-            <a:off x="255494" y="-228600"/>
-            <a:ext cx="12192000" cy="457200"/>
+            <a:off x="20" y="907231"/>
+            <a:ext cx="4838021" cy="5063738"/>
           </a:xfrm>
-          <a:prstGeom prst="rect">
+          <a:custGeom>
             <a:avLst/>
-          </a:prstGeom>
-          <a:noFill/>
-          <a:ln>
-            <a:noFill/>
-          </a:ln>
-          <a:effectLst/>
-          <a:extLst>
-            <a:ext uri="{909E8E84-426E-40DD-AFC4-6F175D3DCCD1}">
-              <a14:hiddenFill xmlns:a14="http://schemas.microsoft.com/office/drawing/2010/main">
-                <a:solidFill>
-                  <a:schemeClr val="accent1"/>
-                </a:solidFill>
-              </a14:hiddenFill>
-            </a:ext>
-            <a:ext uri="{91240B29-F687-4F45-9708-019B960494DF}">
-              <a14:hiddenLine xmlns:a14="http://schemas.microsoft.com/office/drawing/2010/main" w="9525">
-                <a:solidFill>
-                  <a:schemeClr val="tx1"/>
-                </a:solidFill>
-                <a:miter lim="800000"/>
-                <a:headEnd/>
-                <a:tailEnd/>
-              </a14:hiddenLine>
-            </a:ext>
-            <a:ext uri="{AF507438-7753-43E0-B8FC-AC1667EBCBE1}">
-              <a14:hiddenEffects xmlns:a14="http://schemas.microsoft.com/office/drawing/2010/main">
-                <a:effectLst>
-                  <a:outerShdw dist="35921" dir="2700000" algn="ctr" rotWithShape="0">
-                    <a:schemeClr val="bg2"/>
-                  </a:outerShdw>
-                </a:effectLst>
-              </a14:hiddenEffects>
-            </a:ext>
-          </a:extLst>
+            <a:gdLst>
+              <a:gd name="connsiteX0" fmla="*/ 2306172 w 4838041"/>
+              <a:gd name="connsiteY0" fmla="*/ 0 h 5063738"/>
+              <a:gd name="connsiteX1" fmla="*/ 4838041 w 4838041"/>
+              <a:gd name="connsiteY1" fmla="*/ 2531869 h 5063738"/>
+              <a:gd name="connsiteX2" fmla="*/ 2306172 w 4838041"/>
+              <a:gd name="connsiteY2" fmla="*/ 5063738 h 5063738"/>
+              <a:gd name="connsiteX3" fmla="*/ 79886 w 4838041"/>
+              <a:gd name="connsiteY3" fmla="*/ 3738709 h 5063738"/>
+              <a:gd name="connsiteX4" fmla="*/ 0 w 4838041"/>
+              <a:gd name="connsiteY4" fmla="*/ 3572876 h 5063738"/>
+              <a:gd name="connsiteX5" fmla="*/ 0 w 4838041"/>
+              <a:gd name="connsiteY5" fmla="*/ 1490863 h 5063738"/>
+              <a:gd name="connsiteX6" fmla="*/ 79886 w 4838041"/>
+              <a:gd name="connsiteY6" fmla="*/ 1325030 h 5063738"/>
+              <a:gd name="connsiteX7" fmla="*/ 2306172 w 4838041"/>
+              <a:gd name="connsiteY7" fmla="*/ 0 h 5063738"/>
+            </a:gdLst>
+            <a:ahLst/>
+            <a:cxnLst>
+              <a:cxn ang="0">
+                <a:pos x="connsiteX0" y="connsiteY0"/>
+              </a:cxn>
+              <a:cxn ang="0">
+                <a:pos x="connsiteX1" y="connsiteY1"/>
+              </a:cxn>
+              <a:cxn ang="0">
+                <a:pos x="connsiteX2" y="connsiteY2"/>
+              </a:cxn>
+              <a:cxn ang="0">
+                <a:pos x="connsiteX3" y="connsiteY3"/>
+              </a:cxn>
+              <a:cxn ang="0">
+                <a:pos x="connsiteX4" y="connsiteY4"/>
+              </a:cxn>
+              <a:cxn ang="0">
+                <a:pos x="connsiteX5" y="connsiteY5"/>
+              </a:cxn>
+              <a:cxn ang="0">
+                <a:pos x="connsiteX6" y="connsiteY6"/>
+              </a:cxn>
+              <a:cxn ang="0">
+                <a:pos x="connsiteX7" y="connsiteY7"/>
+              </a:cxn>
+            </a:cxnLst>
+            <a:rect l="l" t="t" r="r" b="b"/>
+            <a:pathLst>
+              <a:path w="4838041" h="5063738">
+                <a:moveTo>
+                  <a:pt x="2306172" y="0"/>
+                </a:moveTo>
+                <a:cubicBezTo>
+                  <a:pt x="3704485" y="0"/>
+                  <a:pt x="4838041" y="1133556"/>
+                  <a:pt x="4838041" y="2531869"/>
+                </a:cubicBezTo>
+                <a:cubicBezTo>
+                  <a:pt x="4838041" y="3930182"/>
+                  <a:pt x="3704485" y="5063738"/>
+                  <a:pt x="2306172" y="5063738"/>
+                </a:cubicBezTo>
+                <a:cubicBezTo>
+                  <a:pt x="1344832" y="5063738"/>
+                  <a:pt x="508631" y="4527956"/>
+                  <a:pt x="79886" y="3738709"/>
+                </a:cubicBezTo>
+                <a:lnTo>
+                  <a:pt x="0" y="3572876"/>
+                </a:lnTo>
+                <a:lnTo>
+                  <a:pt x="0" y="1490863"/>
+                </a:lnTo>
+                <a:lnTo>
+                  <a:pt x="79886" y="1325030"/>
+                </a:lnTo>
+                <a:cubicBezTo>
+                  <a:pt x="508631" y="535783"/>
+                  <a:pt x="1344832" y="0"/>
+                  <a:pt x="2306172" y="0"/>
+                </a:cubicBezTo>
+                <a:close/>
+              </a:path>
+            </a:pathLst>
+          </a:custGeom>
+          <a:effectLst>
+            <a:softEdge rad="0"/>
+          </a:effectLst>
         </p:spPr>
-        <p:txBody>
-          <a:bodyPr vert="horz" wrap="none" lIns="91440" tIns="45720" rIns="91440" bIns="45720" numCol="1" anchor="ctr" anchorCtr="0" compatLnSpc="1">
-            <a:prstTxWarp prst="textNoShape">
-              <a:avLst/>
-            </a:prstTxWarp>
-            <a:spAutoFit/>
-          </a:bodyPr>
-          <a:lstStyle/>
-          <a:p>
-            <a:endParaRPr lang="fr-FR"/>
-          </a:p>
-        </p:txBody>
-      </p:sp>
-      <p:sp>
-        <p:nvSpPr>
-          <p:cNvPr id="9" name="Rectangle 9">
+      </p:pic>
+    </p:spTree>
+    <p:extLst>
+      <p:ext uri="{BB962C8B-B14F-4D97-AF65-F5344CB8AC3E}">
+        <p14:creationId xmlns:p14="http://schemas.microsoft.com/office/powerpoint/2010/main" val="3845375637"/>
+      </p:ext>
+    </p:extLst>
+  </p:cSld>
+  <p:clrMapOvr>
+    <a:masterClrMapping/>
+  </p:clrMapOvr>
+</p:sld>
+</file>
+
+<file path=ppt/slides/slide2.xml><?xml version="1.0" encoding="utf-8"?>
+<p:sld xmlns:a="http://schemas.openxmlformats.org/drawingml/2006/main" xmlns:r="http://schemas.openxmlformats.org/officeDocument/2006/relationships" xmlns:p="http://schemas.openxmlformats.org/presentationml/2006/main">
+  <p:cSld>
+    <p:spTree>
+      <p:nvGrpSpPr>
+        <p:cNvPr id="1" name=""/>
+        <p:cNvGrpSpPr/>
+        <p:nvPr/>
+      </p:nvGrpSpPr>
+      <p:grpSpPr>
+        <a:xfrm>
+          <a:off x="0" y="0"/>
+          <a:ext cx="0" cy="0"/>
+          <a:chOff x="0" y="0"/>
+          <a:chExt cx="0" cy="0"/>
+        </a:xfrm>
+      </p:grpSpPr>
+      <p:sp>
+        <p:nvSpPr>
+          <p:cNvPr id="2" name="Titre 1">
             <a:extLst>
               <a:ext uri="{FF2B5EF4-FFF2-40B4-BE49-F238E27FC236}">
-                <a16:creationId xmlns:a16="http://schemas.microsoft.com/office/drawing/2014/main" id="{0866C0CD-5EC5-C646-A117-FCACAF6D0FDA}"/>
+                <a16:creationId xmlns:a16="http://schemas.microsoft.com/office/drawing/2014/main" id="{BB0A699D-BB06-2C47-93B6-4159FA780FD0}"/>
               </a:ext>
             </a:extLst>
           </p:cNvPr>
           <p:cNvSpPr>
-            <a:spLocks noChangeArrowheads="1"/>
-          </p:cNvSpPr>
-          <p:nvPr/>
-        </p:nvSpPr>
-        <p:spPr bwMode="auto">
-          <a:xfrm>
-            <a:off x="712694" y="228600"/>
-            <a:ext cx="12192000" cy="0"/>
-          </a:xfrm>
-          <a:prstGeom prst="rect">
-            <a:avLst/>
-          </a:prstGeom>
-          <a:noFill/>
-          <a:ln>
-            <a:noFill/>
-          </a:ln>
-          <a:effectLst/>
-          <a:extLst>
-            <a:ext uri="{909E8E84-426E-40DD-AFC4-6F175D3DCCD1}">
-              <a14:hiddenFill xmlns:a14="http://schemas.microsoft.com/office/drawing/2010/main">
-                <a:solidFill>
-                  <a:schemeClr val="accent1"/>
-                </a:solidFill>
-              </a14:hiddenFill>
-            </a:ext>
-            <a:ext uri="{91240B29-F687-4F45-9708-019B960494DF}">
-              <a14:hiddenLine xmlns:a14="http://schemas.microsoft.com/office/drawing/2010/main" w="9525">
-                <a:solidFill>
-                  <a:schemeClr val="tx1"/>
-                </a:solidFill>
-                <a:miter lim="800000"/>
-                <a:headEnd/>
-                <a:tailEnd/>
-              </a14:hiddenLine>
-            </a:ext>
-            <a:ext uri="{AF507438-7753-43E0-B8FC-AC1667EBCBE1}">
-              <a14:hiddenEffects xmlns:a14="http://schemas.microsoft.com/office/drawing/2010/main">
-                <a:effectLst>
-                  <a:outerShdw dist="35921" dir="2700000" algn="ctr" rotWithShape="0">
-                    <a:schemeClr val="bg2"/>
-                  </a:outerShdw>
-                </a:effectLst>
-              </a14:hiddenEffects>
-            </a:ext>
-          </a:extLst>
-        </p:spPr>
-        <p:txBody>
-          <a:bodyPr vert="horz" wrap="none" lIns="91440" tIns="45720" rIns="91440" bIns="45720" numCol="1" anchor="ctr" anchorCtr="0" compatLnSpc="1">
-            <a:prstTxWarp prst="textNoShape">
-              <a:avLst/>
-            </a:prstTxWarp>
-            <a:spAutoFit/>
-          </a:bodyPr>
+            <a:spLocks noGrp="1"/>
+          </p:cNvSpPr>
+          <p:nvPr>
+            <p:ph type="title"/>
+          </p:nvPr>
+        </p:nvSpPr>
+        <p:spPr/>
+        <p:txBody>
+          <a:bodyPr/>
+          <a:lstStyle/>
+          <a:p>
+            <a:endParaRPr lang="fr-FR"/>
+          </a:p>
+        </p:txBody>
+      </p:sp>
+      <p:sp>
+        <p:nvSpPr>
+          <p:cNvPr id="3" name="Espace réservé du contenu 2">
+            <a:extLst>
+              <a:ext uri="{FF2B5EF4-FFF2-40B4-BE49-F238E27FC236}">
+                <a16:creationId xmlns:a16="http://schemas.microsoft.com/office/drawing/2014/main" id="{F7582E5B-BDAF-4B43-A522-734DFA2154EB}"/>
+              </a:ext>
+            </a:extLst>
+          </p:cNvPr>
+          <p:cNvSpPr>
+            <a:spLocks noGrp="1"/>
+          </p:cNvSpPr>
+          <p:nvPr>
+            <p:ph idx="1"/>
+          </p:nvPr>
+        </p:nvSpPr>
+        <p:spPr/>
+        <p:txBody>
+          <a:bodyPr/>
           <a:lstStyle/>
           <a:p>
             <a:endParaRPr lang="fr-FR"/>
@@ -3411,7 +3128,7 @@
     </p:spTree>
     <p:extLst>
       <p:ext uri="{BB962C8B-B14F-4D97-AF65-F5344CB8AC3E}">
-        <p14:creationId xmlns:p14="http://schemas.microsoft.com/office/powerpoint/2010/main" val="1862091212"/>
+        <p14:creationId xmlns:p14="http://schemas.microsoft.com/office/powerpoint/2010/main" val="4187382134"/>
       </p:ext>
     </p:extLst>
   </p:cSld>
@@ -3424,7 +3141,7 @@
 <file path=ppt/theme/theme1.xml><?xml version="1.0" encoding="utf-8"?>
 <a:theme xmlns:a="http://schemas.openxmlformats.org/drawingml/2006/main" name="Thème Office">
   <a:themeElements>
-    <a:clrScheme name="Office">
+    <a:clrScheme name="Thème Office">
       <a:dk1>
         <a:sysClr val="windowText" lastClr="000000"/>
       </a:dk1>
@@ -3438,22 +3155,22 @@
         <a:srgbClr val="E7E6E6"/>
       </a:lt2>
       <a:accent1>
-        <a:srgbClr val="4472C4"/>
+        <a:srgbClr val="29AF8C"/>
       </a:accent1>
       <a:accent2>
-        <a:srgbClr val="ED7D31"/>
+        <a:srgbClr val="97BE49"/>
       </a:accent2>
       <a:accent3>
-        <a:srgbClr val="A5A5A5"/>
+        <a:srgbClr val="3D9CCC"/>
       </a:accent3>
       <a:accent4>
-        <a:srgbClr val="FFC000"/>
+        <a:srgbClr val="7C60C6"/>
       </a:accent4>
       <a:accent5>
-        <a:srgbClr val="5B9BD5"/>
+        <a:srgbClr val="C9492C"/>
       </a:accent5>
       <a:accent6>
-        <a:srgbClr val="70AD47"/>
+        <a:srgbClr val="D58C2E"/>
       </a:accent6>
       <a:hlink>
         <a:srgbClr val="0563C1"/>
@@ -3462,7 +3179,7 @@
         <a:srgbClr val="954F72"/>
       </a:folHlink>
     </a:clrScheme>
-    <a:fontScheme name="Office">
+    <a:fontScheme name="Thème Office">
       <a:majorFont>
         <a:latin typeface="Calibri Light" panose="020F0302020204030204"/>
         <a:ea typeface=""/>
@@ -3497,23 +3214,6 @@
         <a:font script="Viet" typeface="Times New Roman"/>
         <a:font script="Uigh" typeface="Microsoft Uighur"/>
         <a:font script="Geor" typeface="Sylfaen"/>
-        <a:font script="Armn" typeface="Arial"/>
-        <a:font script="Bugi" typeface="Leelawadee UI"/>
-        <a:font script="Bopo" typeface="Microsoft JhengHei"/>
-        <a:font script="Java" typeface="Javanese Text"/>
-        <a:font script="Lisu" typeface="Segoe UI"/>
-        <a:font script="Mymr" typeface="Myanmar Text"/>
-        <a:font script="Nkoo" typeface="Ebrima"/>
-        <a:font script="Olck" typeface="Nirmala UI"/>
-        <a:font script="Osma" typeface="Ebrima"/>
-        <a:font script="Phag" typeface="Phagspa"/>
-        <a:font script="Syrn" typeface="Estrangelo Edessa"/>
-        <a:font script="Syrj" typeface="Estrangelo Edessa"/>
-        <a:font script="Syre" typeface="Estrangelo Edessa"/>
-        <a:font script="Sora" typeface="Nirmala UI"/>
-        <a:font script="Tale" typeface="Microsoft Tai Le"/>
-        <a:font script="Talu" typeface="Microsoft New Tai Lue"/>
-        <a:font script="Tfng" typeface="Ebrima"/>
       </a:majorFont>
       <a:minorFont>
         <a:latin typeface="Calibri" panose="020F0502020204030204"/>
@@ -3549,26 +3249,9 @@
         <a:font script="Viet" typeface="Arial"/>
         <a:font script="Uigh" typeface="Microsoft Uighur"/>
         <a:font script="Geor" typeface="Sylfaen"/>
-        <a:font script="Armn" typeface="Arial"/>
-        <a:font script="Bugi" typeface="Leelawadee UI"/>
-        <a:font script="Bopo" typeface="Microsoft JhengHei"/>
-        <a:font script="Java" typeface="Javanese Text"/>
-        <a:font script="Lisu" typeface="Segoe UI"/>
-        <a:font script="Mymr" typeface="Myanmar Text"/>
-        <a:font script="Nkoo" typeface="Ebrima"/>
-        <a:font script="Olck" typeface="Nirmala UI"/>
-        <a:font script="Osma" typeface="Ebrima"/>
-        <a:font script="Phag" typeface="Phagspa"/>
-        <a:font script="Syrn" typeface="Estrangelo Edessa"/>
-        <a:font script="Syrj" typeface="Estrangelo Edessa"/>
-        <a:font script="Syre" typeface="Estrangelo Edessa"/>
-        <a:font script="Sora" typeface="Nirmala UI"/>
-        <a:font script="Tale" typeface="Microsoft Tai Le"/>
-        <a:font script="Talu" typeface="Microsoft New Tai Lue"/>
-        <a:font script="Tfng" typeface="Ebrima"/>
       </a:minorFont>
     </a:fontScheme>
-    <a:fmtScheme name="Office">
+    <a:fmtScheme name="Thème Office">
       <a:fillStyleLst>
         <a:solidFill>
           <a:schemeClr val="phClr"/>
@@ -3710,7 +3393,7 @@
   <a:extraClrSchemeLst/>
   <a:extLst>
     <a:ext uri="{05A4C25C-085E-4340-85A3-A5531E510DB2}">
-      <thm15:themeFamily xmlns:thm15="http://schemas.microsoft.com/office/thememl/2012/main" name="Office Theme" id="{62F939B6-93AF-4DB8-9C6B-D6C7DFDC589F}" vid="{4A3C46E8-61CC-4603-A589-7422A47A8E4A}"/>
+      <thm15:themeFamily xmlns:thm15="http://schemas.microsoft.com/office/thememl/2012/main" name="Office Theme" id="{62F939B6-93AF-4DB8-9C6B-D6C7DFDC589F}" vid="{3E4F19A7-A959-40BB-972C-4880BAF8EB09}"/>
     </a:ext>
   </a:extLst>
 </a:theme>

</xml_diff>